<commit_message>
added boss + bug fixes
</commit_message>
<xml_diff>
--- a/images/images.pptx
+++ b/images/images.pptx
@@ -10,6 +10,9 @@
     <p:sldId id="258" r:id="rId4"/>
     <p:sldId id="259" r:id="rId5"/>
     <p:sldId id="260" r:id="rId6"/>
+    <p:sldId id="261" r:id="rId7"/>
+    <p:sldId id="262" r:id="rId8"/>
+    <p:sldId id="263" r:id="rId9"/>
   </p:sldIdLst>
   <p:sldSz cx="12192000" cy="6858000"/>
   <p:notesSz cx="6858000" cy="9144000"/>
@@ -263,7 +266,7 @@
           <a:p>
             <a:fld id="{539B29B4-1E10-4D34-85D0-CD777A4FEE39}" type="datetimeFigureOut">
               <a:rPr lang="en-US" smtClean="0"/>
-              <a:t>2/6/2024</a:t>
+              <a:t>2/17/2024</a:t>
             </a:fld>
             <a:endParaRPr lang="en-US"/>
           </a:p>
@@ -461,7 +464,7 @@
           <a:p>
             <a:fld id="{539B29B4-1E10-4D34-85D0-CD777A4FEE39}" type="datetimeFigureOut">
               <a:rPr lang="en-US" smtClean="0"/>
-              <a:t>2/6/2024</a:t>
+              <a:t>2/17/2024</a:t>
             </a:fld>
             <a:endParaRPr lang="en-US"/>
           </a:p>
@@ -669,7 +672,7 @@
           <a:p>
             <a:fld id="{539B29B4-1E10-4D34-85D0-CD777A4FEE39}" type="datetimeFigureOut">
               <a:rPr lang="en-US" smtClean="0"/>
-              <a:t>2/6/2024</a:t>
+              <a:t>2/17/2024</a:t>
             </a:fld>
             <a:endParaRPr lang="en-US"/>
           </a:p>
@@ -867,7 +870,7 @@
           <a:p>
             <a:fld id="{539B29B4-1E10-4D34-85D0-CD777A4FEE39}" type="datetimeFigureOut">
               <a:rPr lang="en-US" smtClean="0"/>
-              <a:t>2/6/2024</a:t>
+              <a:t>2/17/2024</a:t>
             </a:fld>
             <a:endParaRPr lang="en-US"/>
           </a:p>
@@ -1142,7 +1145,7 @@
           <a:p>
             <a:fld id="{539B29B4-1E10-4D34-85D0-CD777A4FEE39}" type="datetimeFigureOut">
               <a:rPr lang="en-US" smtClean="0"/>
-              <a:t>2/6/2024</a:t>
+              <a:t>2/17/2024</a:t>
             </a:fld>
             <a:endParaRPr lang="en-US"/>
           </a:p>
@@ -1407,7 +1410,7 @@
           <a:p>
             <a:fld id="{539B29B4-1E10-4D34-85D0-CD777A4FEE39}" type="datetimeFigureOut">
               <a:rPr lang="en-US" smtClean="0"/>
-              <a:t>2/6/2024</a:t>
+              <a:t>2/17/2024</a:t>
             </a:fld>
             <a:endParaRPr lang="en-US"/>
           </a:p>
@@ -1819,7 +1822,7 @@
           <a:p>
             <a:fld id="{539B29B4-1E10-4D34-85D0-CD777A4FEE39}" type="datetimeFigureOut">
               <a:rPr lang="en-US" smtClean="0"/>
-              <a:t>2/6/2024</a:t>
+              <a:t>2/17/2024</a:t>
             </a:fld>
             <a:endParaRPr lang="en-US"/>
           </a:p>
@@ -1960,7 +1963,7 @@
           <a:p>
             <a:fld id="{539B29B4-1E10-4D34-85D0-CD777A4FEE39}" type="datetimeFigureOut">
               <a:rPr lang="en-US" smtClean="0"/>
-              <a:t>2/6/2024</a:t>
+              <a:t>2/17/2024</a:t>
             </a:fld>
             <a:endParaRPr lang="en-US"/>
           </a:p>
@@ -2073,7 +2076,7 @@
           <a:p>
             <a:fld id="{539B29B4-1E10-4D34-85D0-CD777A4FEE39}" type="datetimeFigureOut">
               <a:rPr lang="en-US" smtClean="0"/>
-              <a:t>2/6/2024</a:t>
+              <a:t>2/17/2024</a:t>
             </a:fld>
             <a:endParaRPr lang="en-US"/>
           </a:p>
@@ -2384,7 +2387,7 @@
           <a:p>
             <a:fld id="{539B29B4-1E10-4D34-85D0-CD777A4FEE39}" type="datetimeFigureOut">
               <a:rPr lang="en-US" smtClean="0"/>
-              <a:t>2/6/2024</a:t>
+              <a:t>2/17/2024</a:t>
             </a:fld>
             <a:endParaRPr lang="en-US"/>
           </a:p>
@@ -2672,7 +2675,7 @@
           <a:p>
             <a:fld id="{539B29B4-1E10-4D34-85D0-CD777A4FEE39}" type="datetimeFigureOut">
               <a:rPr lang="en-US" smtClean="0"/>
-              <a:t>2/6/2024</a:t>
+              <a:t>2/17/2024</a:t>
             </a:fld>
             <a:endParaRPr lang="en-US"/>
           </a:p>
@@ -2913,7 +2916,7 @@
           <a:p>
             <a:fld id="{539B29B4-1E10-4D34-85D0-CD777A4FEE39}" type="datetimeFigureOut">
               <a:rPr lang="en-US" smtClean="0"/>
-              <a:t>2/6/2024</a:t>
+              <a:t>2/17/2024</a:t>
             </a:fld>
             <a:endParaRPr lang="en-US"/>
           </a:p>
@@ -5148,6 +5151,706 @@
 </p:sld>
 </file>
 
+<file path=ppt/slides/slide6.xml><?xml version="1.0" encoding="utf-8"?>
+<p:sld xmlns:a="http://schemas.openxmlformats.org/drawingml/2006/main" xmlns:r="http://schemas.openxmlformats.org/officeDocument/2006/relationships" xmlns:p="http://schemas.openxmlformats.org/presentationml/2006/main">
+  <p:cSld>
+    <p:spTree>
+      <p:nvGrpSpPr>
+        <p:cNvPr id="1" name=""/>
+        <p:cNvGrpSpPr/>
+        <p:nvPr/>
+      </p:nvGrpSpPr>
+      <p:grpSpPr>
+        <a:xfrm>
+          <a:off x="0" y="0"/>
+          <a:ext cx="0" cy="0"/>
+          <a:chOff x="0" y="0"/>
+          <a:chExt cx="0" cy="0"/>
+        </a:xfrm>
+      </p:grpSpPr>
+      <p:grpSp>
+        <p:nvGrpSpPr>
+          <p:cNvPr id="6" name="Group 5">
+            <a:extLst>
+              <a:ext uri="{FF2B5EF4-FFF2-40B4-BE49-F238E27FC236}">
+                <a16:creationId xmlns:a16="http://schemas.microsoft.com/office/drawing/2014/main" id="{AC578AAF-D1F9-A1F5-C972-F3813EB67D78}"/>
+              </a:ext>
+            </a:extLst>
+          </p:cNvPr>
+          <p:cNvGrpSpPr/>
+          <p:nvPr/>
+        </p:nvGrpSpPr>
+        <p:grpSpPr>
+          <a:xfrm>
+            <a:off x="3119717" y="2308411"/>
+            <a:ext cx="5952565" cy="2613213"/>
+            <a:chOff x="3119717" y="2308411"/>
+            <a:chExt cx="5952565" cy="2613213"/>
+          </a:xfrm>
+        </p:grpSpPr>
+        <p:sp>
+          <p:nvSpPr>
+            <p:cNvPr id="7" name="Rectangle: Rounded Corners 6">
+              <a:extLst>
+                <a:ext uri="{FF2B5EF4-FFF2-40B4-BE49-F238E27FC236}">
+                  <a16:creationId xmlns:a16="http://schemas.microsoft.com/office/drawing/2014/main" id="{83B44C12-814A-09D8-56AE-E725AACAB136}"/>
+                </a:ext>
+              </a:extLst>
+            </p:cNvPr>
+            <p:cNvSpPr/>
+            <p:nvPr/>
+          </p:nvSpPr>
+          <p:spPr>
+            <a:xfrm>
+              <a:off x="3119717" y="2308411"/>
+              <a:ext cx="5952565" cy="2241177"/>
+            </a:xfrm>
+            <a:prstGeom prst="roundRect">
+              <a:avLst>
+                <a:gd name="adj" fmla="val 17067"/>
+              </a:avLst>
+            </a:prstGeom>
+          </p:spPr>
+          <p:style>
+            <a:lnRef idx="2">
+              <a:schemeClr val="accent1">
+                <a:shade val="15000"/>
+              </a:schemeClr>
+            </a:lnRef>
+            <a:fillRef idx="1">
+              <a:schemeClr val="accent1"/>
+            </a:fillRef>
+            <a:effectRef idx="0">
+              <a:schemeClr val="accent1"/>
+            </a:effectRef>
+            <a:fontRef idx="minor">
+              <a:schemeClr val="lt1"/>
+            </a:fontRef>
+          </p:style>
+          <p:txBody>
+            <a:bodyPr rtlCol="0" anchor="ctr"/>
+            <a:lstStyle/>
+            <a:p>
+              <a:pPr algn="ctr"/>
+              <a:r>
+                <a:rPr lang="en-US" sz="6600" dirty="0">
+                  <a:latin typeface="Aptos Black" panose="020B0004020202020204" pitchFamily="34" charset="0"/>
+                </a:rPr>
+                <a:t>PAUSED</a:t>
+              </a:r>
+            </a:p>
+          </p:txBody>
+        </p:sp>
+        <p:sp>
+          <p:nvSpPr>
+            <p:cNvPr id="8" name="Rectangle 7">
+              <a:extLst>
+                <a:ext uri="{FF2B5EF4-FFF2-40B4-BE49-F238E27FC236}">
+                  <a16:creationId xmlns:a16="http://schemas.microsoft.com/office/drawing/2014/main" id="{F2984250-3F58-51A1-A220-D99E47D2C241}"/>
+                </a:ext>
+              </a:extLst>
+            </p:cNvPr>
+            <p:cNvSpPr/>
+            <p:nvPr/>
+          </p:nvSpPr>
+          <p:spPr>
+            <a:xfrm>
+              <a:off x="3290047" y="4625788"/>
+              <a:ext cx="5567082" cy="295836"/>
+            </a:xfrm>
+            <a:prstGeom prst="rect">
+              <a:avLst/>
+            </a:prstGeom>
+          </p:spPr>
+          <p:style>
+            <a:lnRef idx="2">
+              <a:schemeClr val="accent1">
+                <a:shade val="15000"/>
+              </a:schemeClr>
+            </a:lnRef>
+            <a:fillRef idx="1">
+              <a:schemeClr val="accent1"/>
+            </a:fillRef>
+            <a:effectRef idx="0">
+              <a:schemeClr val="accent1"/>
+            </a:effectRef>
+            <a:fontRef idx="minor">
+              <a:schemeClr val="lt1"/>
+            </a:fontRef>
+          </p:style>
+          <p:txBody>
+            <a:bodyPr rtlCol="0" anchor="ctr"/>
+            <a:lstStyle/>
+            <a:p>
+              <a:pPr algn="ctr"/>
+              <a:r>
+                <a:rPr lang="en-US"/>
+                <a:t>PRESS ‘R’ TO RESUME</a:t>
+              </a:r>
+              <a:endParaRPr lang="en-US" dirty="0"/>
+            </a:p>
+          </p:txBody>
+        </p:sp>
+      </p:grpSp>
+    </p:spTree>
+    <p:extLst>
+      <p:ext uri="{BB962C8B-B14F-4D97-AF65-F5344CB8AC3E}">
+        <p14:creationId xmlns:p14="http://schemas.microsoft.com/office/powerpoint/2010/main" val="2975159702"/>
+      </p:ext>
+    </p:extLst>
+  </p:cSld>
+  <p:clrMapOvr>
+    <a:masterClrMapping/>
+  </p:clrMapOvr>
+</p:sld>
+</file>
+
+<file path=ppt/slides/slide7.xml><?xml version="1.0" encoding="utf-8"?>
+<p:sld xmlns:a="http://schemas.openxmlformats.org/drawingml/2006/main" xmlns:r="http://schemas.openxmlformats.org/officeDocument/2006/relationships" xmlns:p="http://schemas.openxmlformats.org/presentationml/2006/main">
+  <p:cSld>
+    <p:spTree>
+      <p:nvGrpSpPr>
+        <p:cNvPr id="1" name=""/>
+        <p:cNvGrpSpPr/>
+        <p:nvPr/>
+      </p:nvGrpSpPr>
+      <p:grpSpPr>
+        <a:xfrm>
+          <a:off x="0" y="0"/>
+          <a:ext cx="0" cy="0"/>
+          <a:chOff x="0" y="0"/>
+          <a:chExt cx="0" cy="0"/>
+        </a:xfrm>
+      </p:grpSpPr>
+      <p:sp>
+        <p:nvSpPr>
+          <p:cNvPr id="5" name="Explosion: 8 Points 4">
+            <a:extLst>
+              <a:ext uri="{FF2B5EF4-FFF2-40B4-BE49-F238E27FC236}">
+                <a16:creationId xmlns:a16="http://schemas.microsoft.com/office/drawing/2014/main" id="{DEDCCFF0-CD85-4D4D-F208-E85B67655346}"/>
+              </a:ext>
+            </a:extLst>
+          </p:cNvPr>
+          <p:cNvSpPr/>
+          <p:nvPr/>
+        </p:nvSpPr>
+        <p:spPr>
+          <a:xfrm>
+            <a:off x="3931023" y="1577788"/>
+            <a:ext cx="4329953" cy="3272118"/>
+          </a:xfrm>
+          <a:prstGeom prst="irregularSeal1">
+            <a:avLst/>
+          </a:prstGeom>
+          <a:solidFill>
+            <a:schemeClr val="accent5">
+              <a:lumMod val="60000"/>
+              <a:lumOff val="40000"/>
+            </a:schemeClr>
+          </a:solidFill>
+        </p:spPr>
+        <p:style>
+          <a:lnRef idx="2">
+            <a:schemeClr val="accent1">
+              <a:shade val="15000"/>
+            </a:schemeClr>
+          </a:lnRef>
+          <a:fillRef idx="1">
+            <a:schemeClr val="accent1"/>
+          </a:fillRef>
+          <a:effectRef idx="0">
+            <a:schemeClr val="accent1"/>
+          </a:effectRef>
+          <a:fontRef idx="minor">
+            <a:schemeClr val="lt1"/>
+          </a:fontRef>
+        </p:style>
+        <p:txBody>
+          <a:bodyPr rtlCol="0" anchor="ctr"/>
+          <a:lstStyle/>
+          <a:p>
+            <a:pPr algn="ctr"/>
+            <a:r>
+              <a:rPr lang="en-US" sz="4000" dirty="0">
+                <a:latin typeface="Aharoni" panose="02010803020104030203" pitchFamily="2" charset="-79"/>
+                <a:cs typeface="Aharoni" panose="02010803020104030203" pitchFamily="2" charset="-79"/>
+              </a:rPr>
+              <a:t>WINNER</a:t>
+            </a:r>
+          </a:p>
+          <a:p>
+            <a:pPr algn="ctr"/>
+            <a:r>
+              <a:rPr lang="en-US" sz="1600" dirty="0">
+                <a:latin typeface="Aharoni" panose="02010803020104030203" pitchFamily="2" charset="-79"/>
+                <a:cs typeface="Aharoni" panose="02010803020104030203" pitchFamily="2" charset="-79"/>
+              </a:rPr>
+              <a:t>Press R for main menu</a:t>
+            </a:r>
+          </a:p>
+        </p:txBody>
+      </p:sp>
+    </p:spTree>
+    <p:extLst>
+      <p:ext uri="{BB962C8B-B14F-4D97-AF65-F5344CB8AC3E}">
+        <p14:creationId xmlns:p14="http://schemas.microsoft.com/office/powerpoint/2010/main" val="3477451611"/>
+      </p:ext>
+    </p:extLst>
+  </p:cSld>
+  <p:clrMapOvr>
+    <a:masterClrMapping/>
+  </p:clrMapOvr>
+</p:sld>
+</file>
+
+<file path=ppt/slides/slide8.xml><?xml version="1.0" encoding="utf-8"?>
+<p:sld xmlns:a="http://schemas.openxmlformats.org/drawingml/2006/main" xmlns:r="http://schemas.openxmlformats.org/officeDocument/2006/relationships" xmlns:p="http://schemas.openxmlformats.org/presentationml/2006/main">
+  <p:cSld>
+    <p:spTree>
+      <p:nvGrpSpPr>
+        <p:cNvPr id="1" name=""/>
+        <p:cNvGrpSpPr/>
+        <p:nvPr/>
+      </p:nvGrpSpPr>
+      <p:grpSpPr>
+        <a:xfrm>
+          <a:off x="0" y="0"/>
+          <a:ext cx="0" cy="0"/>
+          <a:chOff x="0" y="0"/>
+          <a:chExt cx="0" cy="0"/>
+        </a:xfrm>
+      </p:grpSpPr>
+      <p:grpSp>
+        <p:nvGrpSpPr>
+          <p:cNvPr id="10" name="Group 9">
+            <a:extLst>
+              <a:ext uri="{FF2B5EF4-FFF2-40B4-BE49-F238E27FC236}">
+                <a16:creationId xmlns:a16="http://schemas.microsoft.com/office/drawing/2014/main" id="{FC7209A1-80F9-C978-275A-6DAE564D827E}"/>
+              </a:ext>
+            </a:extLst>
+          </p:cNvPr>
+          <p:cNvGrpSpPr/>
+          <p:nvPr/>
+        </p:nvGrpSpPr>
+        <p:grpSpPr>
+          <a:xfrm>
+            <a:off x="852487" y="236645"/>
+            <a:ext cx="10487025" cy="6554391"/>
+            <a:chOff x="852487" y="236645"/>
+            <a:chExt cx="10487025" cy="6554391"/>
+          </a:xfrm>
+        </p:grpSpPr>
+        <p:grpSp>
+          <p:nvGrpSpPr>
+            <p:cNvPr id="15" name="Group 14">
+              <a:extLst>
+                <a:ext uri="{FF2B5EF4-FFF2-40B4-BE49-F238E27FC236}">
+                  <a16:creationId xmlns:a16="http://schemas.microsoft.com/office/drawing/2014/main" id="{C16D5CEF-FCD7-C9E6-A62D-C7536D54C630}"/>
+                </a:ext>
+              </a:extLst>
+            </p:cNvPr>
+            <p:cNvGrpSpPr/>
+            <p:nvPr/>
+          </p:nvGrpSpPr>
+          <p:grpSpPr>
+            <a:xfrm>
+              <a:off x="852487" y="236645"/>
+              <a:ext cx="10487025" cy="6554391"/>
+              <a:chOff x="852487" y="236645"/>
+              <a:chExt cx="10487025" cy="6554391"/>
+            </a:xfrm>
+          </p:grpSpPr>
+          <p:grpSp>
+            <p:nvGrpSpPr>
+              <p:cNvPr id="4" name="Group 3">
+                <a:extLst>
+                  <a:ext uri="{FF2B5EF4-FFF2-40B4-BE49-F238E27FC236}">
+                    <a16:creationId xmlns:a16="http://schemas.microsoft.com/office/drawing/2014/main" id="{AE878858-C871-A6B1-771E-E414FCFC703B}"/>
+                  </a:ext>
+                </a:extLst>
+              </p:cNvPr>
+              <p:cNvGrpSpPr/>
+              <p:nvPr/>
+            </p:nvGrpSpPr>
+            <p:grpSpPr>
+              <a:xfrm>
+                <a:off x="852487" y="236645"/>
+                <a:ext cx="10487025" cy="6554391"/>
+                <a:chOff x="1030813" y="151804"/>
+                <a:chExt cx="10487025" cy="6554391"/>
+              </a:xfrm>
+            </p:grpSpPr>
+            <p:sp>
+              <p:nvSpPr>
+                <p:cNvPr id="5" name="Rectangle: Rounded Corners 4">
+                  <a:extLst>
+                    <a:ext uri="{FF2B5EF4-FFF2-40B4-BE49-F238E27FC236}">
+                      <a16:creationId xmlns:a16="http://schemas.microsoft.com/office/drawing/2014/main" id="{ACED6574-6C6E-3C72-A950-BA434E6B5FFB}"/>
+                    </a:ext>
+                  </a:extLst>
+                </p:cNvPr>
+                <p:cNvSpPr/>
+                <p:nvPr/>
+              </p:nvSpPr>
+              <p:spPr>
+                <a:xfrm>
+                  <a:off x="5037839" y="4766070"/>
+                  <a:ext cx="2248292" cy="651536"/>
+                </a:xfrm>
+                <a:prstGeom prst="roundRect">
+                  <a:avLst>
+                    <a:gd name="adj" fmla="val 50000"/>
+                  </a:avLst>
+                </a:prstGeom>
+              </p:spPr>
+              <p:style>
+                <a:lnRef idx="3">
+                  <a:schemeClr val="lt1"/>
+                </a:lnRef>
+                <a:fillRef idx="1">
+                  <a:schemeClr val="accent2"/>
+                </a:fillRef>
+                <a:effectRef idx="1">
+                  <a:schemeClr val="accent2"/>
+                </a:effectRef>
+                <a:fontRef idx="minor">
+                  <a:schemeClr val="lt1"/>
+                </a:fontRef>
+              </p:style>
+              <p:txBody>
+                <a:bodyPr rtlCol="0" anchor="ctr"/>
+                <a:lstStyle/>
+                <a:p>
+                  <a:pPr algn="ctr"/>
+                  <a:endParaRPr lang="en-US"/>
+                </a:p>
+              </p:txBody>
+            </p:sp>
+            <p:pic>
+              <p:nvPicPr>
+                <p:cNvPr id="7" name="Picture 6" descr="A video game poster with a city and a space ship">
+                  <a:extLst>
+                    <a:ext uri="{FF2B5EF4-FFF2-40B4-BE49-F238E27FC236}">
+                      <a16:creationId xmlns:a16="http://schemas.microsoft.com/office/drawing/2014/main" id="{9D52E824-A6D0-68BE-FC63-D3F91B0CA919}"/>
+                    </a:ext>
+                  </a:extLst>
+                </p:cNvPr>
+                <p:cNvPicPr>
+                  <a:picLocks noChangeAspect="1"/>
+                </p:cNvPicPr>
+                <p:nvPr/>
+              </p:nvPicPr>
+              <p:blipFill>
+                <a:blip r:embed="rId2">
+                  <a:extLst>
+                    <a:ext uri="{28A0092B-C50C-407E-A947-70E740481C1C}">
+                      <a14:useLocalDpi xmlns:a14="http://schemas.microsoft.com/office/drawing/2010/main" val="0"/>
+                    </a:ext>
+                  </a:extLst>
+                </a:blip>
+                <a:stretch>
+                  <a:fillRect/>
+                </a:stretch>
+              </p:blipFill>
+              <p:spPr>
+                <a:xfrm>
+                  <a:off x="1030813" y="151804"/>
+                  <a:ext cx="10487025" cy="6554391"/>
+                </a:xfrm>
+                <a:prstGeom prst="rect">
+                  <a:avLst/>
+                </a:prstGeom>
+              </p:spPr>
+            </p:pic>
+          </p:grpSp>
+          <p:sp>
+            <p:nvSpPr>
+              <p:cNvPr id="13" name="Multiplication Sign 12">
+                <a:extLst>
+                  <a:ext uri="{FF2B5EF4-FFF2-40B4-BE49-F238E27FC236}">
+                    <a16:creationId xmlns:a16="http://schemas.microsoft.com/office/drawing/2014/main" id="{C6982AE2-1854-5676-468A-8B93C380D298}"/>
+                  </a:ext>
+                </a:extLst>
+              </p:cNvPr>
+              <p:cNvSpPr/>
+              <p:nvPr/>
+            </p:nvSpPr>
+            <p:spPr>
+              <a:xfrm>
+                <a:off x="10573851" y="374466"/>
+                <a:ext cx="659876" cy="612742"/>
+              </a:xfrm>
+              <a:prstGeom prst="mathMultiply">
+                <a:avLst/>
+              </a:prstGeom>
+              <a:solidFill>
+                <a:srgbClr val="92D050"/>
+              </a:solidFill>
+            </p:spPr>
+            <p:style>
+              <a:lnRef idx="2">
+                <a:schemeClr val="accent1">
+                  <a:shade val="15000"/>
+                </a:schemeClr>
+              </a:lnRef>
+              <a:fillRef idx="1">
+                <a:schemeClr val="accent1"/>
+              </a:fillRef>
+              <a:effectRef idx="0">
+                <a:schemeClr val="accent1"/>
+              </a:effectRef>
+              <a:fontRef idx="minor">
+                <a:schemeClr val="lt1"/>
+              </a:fontRef>
+            </p:style>
+            <p:txBody>
+              <a:bodyPr rtlCol="0" anchor="ctr"/>
+              <a:lstStyle/>
+              <a:p>
+                <a:pPr algn="ctr"/>
+                <a:endParaRPr lang="en-US"/>
+              </a:p>
+            </p:txBody>
+          </p:sp>
+          <p:sp>
+            <p:nvSpPr>
+              <p:cNvPr id="14" name="Rectangle 13">
+                <a:extLst>
+                  <a:ext uri="{FF2B5EF4-FFF2-40B4-BE49-F238E27FC236}">
+                    <a16:creationId xmlns:a16="http://schemas.microsoft.com/office/drawing/2014/main" id="{A9F9FEC6-04A6-FD1D-1918-9D980A9AC9FF}"/>
+                  </a:ext>
+                </a:extLst>
+              </p:cNvPr>
+              <p:cNvSpPr/>
+              <p:nvPr/>
+            </p:nvSpPr>
+            <p:spPr>
+              <a:xfrm>
+                <a:off x="5065059" y="4087906"/>
+                <a:ext cx="2248292" cy="651536"/>
+              </a:xfrm>
+              <a:prstGeom prst="rect">
+                <a:avLst/>
+              </a:prstGeom>
+            </p:spPr>
+            <p:style>
+              <a:lnRef idx="2">
+                <a:schemeClr val="accent1">
+                  <a:shade val="15000"/>
+                </a:schemeClr>
+              </a:lnRef>
+              <a:fillRef idx="1">
+                <a:schemeClr val="accent1"/>
+              </a:fillRef>
+              <a:effectRef idx="0">
+                <a:schemeClr val="accent1"/>
+              </a:effectRef>
+              <a:fontRef idx="minor">
+                <a:schemeClr val="lt1"/>
+              </a:fontRef>
+            </p:style>
+            <p:txBody>
+              <a:bodyPr rtlCol="0" anchor="ctr"/>
+              <a:lstStyle/>
+              <a:p>
+                <a:pPr algn="ctr"/>
+                <a:r>
+                  <a:rPr lang="en-US" dirty="0"/>
+                  <a:t>HIGH SCORES</a:t>
+                </a:r>
+              </a:p>
+            </p:txBody>
+          </p:sp>
+        </p:grpSp>
+        <p:sp>
+          <p:nvSpPr>
+            <p:cNvPr id="2" name="TextBox 1">
+              <a:extLst>
+                <a:ext uri="{FF2B5EF4-FFF2-40B4-BE49-F238E27FC236}">
+                  <a16:creationId xmlns:a16="http://schemas.microsoft.com/office/drawing/2014/main" id="{276D07EC-8EAA-F807-B6D2-805DE6D29F75}"/>
+                </a:ext>
+              </a:extLst>
+            </p:cNvPr>
+            <p:cNvSpPr txBox="1"/>
+            <p:nvPr/>
+          </p:nvSpPr>
+          <p:spPr>
+            <a:xfrm>
+              <a:off x="5396753" y="4807347"/>
+              <a:ext cx="373820" cy="369332"/>
+            </a:xfrm>
+            <a:prstGeom prst="rect">
+              <a:avLst/>
+            </a:prstGeom>
+            <a:noFill/>
+          </p:spPr>
+          <p:txBody>
+            <a:bodyPr wrap="none" rtlCol="0">
+              <a:spAutoFit/>
+            </a:bodyPr>
+            <a:lstStyle/>
+            <a:p>
+              <a:r>
+                <a:rPr lang="en-US" dirty="0"/>
+                <a:t>1.</a:t>
+              </a:r>
+            </a:p>
+          </p:txBody>
+        </p:sp>
+        <p:sp>
+          <p:nvSpPr>
+            <p:cNvPr id="3" name="TextBox 2">
+              <a:extLst>
+                <a:ext uri="{FF2B5EF4-FFF2-40B4-BE49-F238E27FC236}">
+                  <a16:creationId xmlns:a16="http://schemas.microsoft.com/office/drawing/2014/main" id="{4DEA157F-3AFD-BDFC-6FF4-93718A56C114}"/>
+                </a:ext>
+              </a:extLst>
+            </p:cNvPr>
+            <p:cNvSpPr txBox="1"/>
+            <p:nvPr/>
+          </p:nvSpPr>
+          <p:spPr>
+            <a:xfrm>
+              <a:off x="5396753" y="5131136"/>
+              <a:ext cx="373820" cy="369332"/>
+            </a:xfrm>
+            <a:prstGeom prst="rect">
+              <a:avLst/>
+            </a:prstGeom>
+            <a:noFill/>
+          </p:spPr>
+          <p:txBody>
+            <a:bodyPr wrap="none" rtlCol="0">
+              <a:spAutoFit/>
+            </a:bodyPr>
+            <a:lstStyle/>
+            <a:p>
+              <a:r>
+                <a:rPr lang="en-US" dirty="0"/>
+                <a:t>2.</a:t>
+              </a:r>
+            </a:p>
+          </p:txBody>
+        </p:sp>
+        <p:sp>
+          <p:nvSpPr>
+            <p:cNvPr id="6" name="TextBox 5">
+              <a:extLst>
+                <a:ext uri="{FF2B5EF4-FFF2-40B4-BE49-F238E27FC236}">
+                  <a16:creationId xmlns:a16="http://schemas.microsoft.com/office/drawing/2014/main" id="{2FA40C92-8860-FF8B-65FE-D438CD83F4E1}"/>
+                </a:ext>
+              </a:extLst>
+            </p:cNvPr>
+            <p:cNvSpPr txBox="1"/>
+            <p:nvPr/>
+          </p:nvSpPr>
+          <p:spPr>
+            <a:xfrm>
+              <a:off x="5396753" y="5451641"/>
+              <a:ext cx="373820" cy="369332"/>
+            </a:xfrm>
+            <a:prstGeom prst="rect">
+              <a:avLst/>
+            </a:prstGeom>
+            <a:noFill/>
+          </p:spPr>
+          <p:txBody>
+            <a:bodyPr wrap="none" rtlCol="0">
+              <a:spAutoFit/>
+            </a:bodyPr>
+            <a:lstStyle/>
+            <a:p>
+              <a:r>
+                <a:rPr lang="en-US" dirty="0"/>
+                <a:t>3.</a:t>
+              </a:r>
+            </a:p>
+          </p:txBody>
+        </p:sp>
+        <p:sp>
+          <p:nvSpPr>
+            <p:cNvPr id="8" name="TextBox 7">
+              <a:extLst>
+                <a:ext uri="{FF2B5EF4-FFF2-40B4-BE49-F238E27FC236}">
+                  <a16:creationId xmlns:a16="http://schemas.microsoft.com/office/drawing/2014/main" id="{89409CE6-5FFA-74F2-17AA-6F5EB31EE0C8}"/>
+                </a:ext>
+              </a:extLst>
+            </p:cNvPr>
+            <p:cNvSpPr txBox="1"/>
+            <p:nvPr/>
+          </p:nvSpPr>
+          <p:spPr>
+            <a:xfrm>
+              <a:off x="5396753" y="5820973"/>
+              <a:ext cx="373820" cy="369332"/>
+            </a:xfrm>
+            <a:prstGeom prst="rect">
+              <a:avLst/>
+            </a:prstGeom>
+            <a:noFill/>
+          </p:spPr>
+          <p:txBody>
+            <a:bodyPr wrap="none" rtlCol="0">
+              <a:spAutoFit/>
+            </a:bodyPr>
+            <a:lstStyle/>
+            <a:p>
+              <a:r>
+                <a:rPr lang="en-US" dirty="0"/>
+                <a:t>4.</a:t>
+              </a:r>
+            </a:p>
+          </p:txBody>
+        </p:sp>
+        <p:sp>
+          <p:nvSpPr>
+            <p:cNvPr id="9" name="TextBox 8">
+              <a:extLst>
+                <a:ext uri="{FF2B5EF4-FFF2-40B4-BE49-F238E27FC236}">
+                  <a16:creationId xmlns:a16="http://schemas.microsoft.com/office/drawing/2014/main" id="{E9717A5B-FEBF-E25C-3804-A1D4CE0E6306}"/>
+                </a:ext>
+              </a:extLst>
+            </p:cNvPr>
+            <p:cNvSpPr txBox="1"/>
+            <p:nvPr/>
+          </p:nvSpPr>
+          <p:spPr>
+            <a:xfrm>
+              <a:off x="5396753" y="6149067"/>
+              <a:ext cx="373820" cy="369332"/>
+            </a:xfrm>
+            <a:prstGeom prst="rect">
+              <a:avLst/>
+            </a:prstGeom>
+            <a:noFill/>
+          </p:spPr>
+          <p:txBody>
+            <a:bodyPr wrap="none" rtlCol="0">
+              <a:spAutoFit/>
+            </a:bodyPr>
+            <a:lstStyle/>
+            <a:p>
+              <a:r>
+                <a:rPr lang="en-US" dirty="0"/>
+                <a:t>5.</a:t>
+              </a:r>
+            </a:p>
+          </p:txBody>
+        </p:sp>
+      </p:grpSp>
+    </p:spTree>
+    <p:extLst>
+      <p:ext uri="{BB962C8B-B14F-4D97-AF65-F5344CB8AC3E}">
+        <p14:creationId xmlns:p14="http://schemas.microsoft.com/office/powerpoint/2010/main" val="1853303283"/>
+      </p:ext>
+    </p:extLst>
+  </p:cSld>
+  <p:clrMapOvr>
+    <a:masterClrMapping/>
+  </p:clrMapOvr>
+</p:sld>
+</file>
+
 <file path=ppt/theme/theme1.xml><?xml version="1.0" encoding="utf-8"?>
 <a:theme xmlns:a="http://schemas.openxmlformats.org/drawingml/2006/main" name="Office Theme">
   <a:themeElements>

</xml_diff>

<commit_message>
enemy count bug fix
</commit_message>
<xml_diff>
--- a/images/images.pptx
+++ b/images/images.pptx
@@ -6,13 +6,15 @@
   </p:sldMasterIdLst>
   <p:sldIdLst>
     <p:sldId id="256" r:id="rId2"/>
-    <p:sldId id="257" r:id="rId3"/>
-    <p:sldId id="258" r:id="rId4"/>
-    <p:sldId id="259" r:id="rId5"/>
-    <p:sldId id="260" r:id="rId6"/>
-    <p:sldId id="261" r:id="rId7"/>
-    <p:sldId id="262" r:id="rId8"/>
-    <p:sldId id="263" r:id="rId9"/>
+    <p:sldId id="264" r:id="rId3"/>
+    <p:sldId id="265" r:id="rId4"/>
+    <p:sldId id="257" r:id="rId5"/>
+    <p:sldId id="258" r:id="rId6"/>
+    <p:sldId id="259" r:id="rId7"/>
+    <p:sldId id="260" r:id="rId8"/>
+    <p:sldId id="261" r:id="rId9"/>
+    <p:sldId id="262" r:id="rId10"/>
+    <p:sldId id="263" r:id="rId11"/>
   </p:sldIdLst>
   <p:sldSz cx="12192000" cy="6858000"/>
   <p:notesSz cx="6858000" cy="9144000"/>
@@ -266,7 +268,7 @@
           <a:p>
             <a:fld id="{539B29B4-1E10-4D34-85D0-CD777A4FEE39}" type="datetimeFigureOut">
               <a:rPr lang="en-US" smtClean="0"/>
-              <a:t>2/17/2024</a:t>
+              <a:t>2/29/2024</a:t>
             </a:fld>
             <a:endParaRPr lang="en-US"/>
           </a:p>
@@ -464,7 +466,7 @@
           <a:p>
             <a:fld id="{539B29B4-1E10-4D34-85D0-CD777A4FEE39}" type="datetimeFigureOut">
               <a:rPr lang="en-US" smtClean="0"/>
-              <a:t>2/17/2024</a:t>
+              <a:t>2/29/2024</a:t>
             </a:fld>
             <a:endParaRPr lang="en-US"/>
           </a:p>
@@ -672,7 +674,7 @@
           <a:p>
             <a:fld id="{539B29B4-1E10-4D34-85D0-CD777A4FEE39}" type="datetimeFigureOut">
               <a:rPr lang="en-US" smtClean="0"/>
-              <a:t>2/17/2024</a:t>
+              <a:t>2/29/2024</a:t>
             </a:fld>
             <a:endParaRPr lang="en-US"/>
           </a:p>
@@ -870,7 +872,7 @@
           <a:p>
             <a:fld id="{539B29B4-1E10-4D34-85D0-CD777A4FEE39}" type="datetimeFigureOut">
               <a:rPr lang="en-US" smtClean="0"/>
-              <a:t>2/17/2024</a:t>
+              <a:t>2/29/2024</a:t>
             </a:fld>
             <a:endParaRPr lang="en-US"/>
           </a:p>
@@ -1145,7 +1147,7 @@
           <a:p>
             <a:fld id="{539B29B4-1E10-4D34-85D0-CD777A4FEE39}" type="datetimeFigureOut">
               <a:rPr lang="en-US" smtClean="0"/>
-              <a:t>2/17/2024</a:t>
+              <a:t>2/29/2024</a:t>
             </a:fld>
             <a:endParaRPr lang="en-US"/>
           </a:p>
@@ -1410,7 +1412,7 @@
           <a:p>
             <a:fld id="{539B29B4-1E10-4D34-85D0-CD777A4FEE39}" type="datetimeFigureOut">
               <a:rPr lang="en-US" smtClean="0"/>
-              <a:t>2/17/2024</a:t>
+              <a:t>2/29/2024</a:t>
             </a:fld>
             <a:endParaRPr lang="en-US"/>
           </a:p>
@@ -1822,7 +1824,7 @@
           <a:p>
             <a:fld id="{539B29B4-1E10-4D34-85D0-CD777A4FEE39}" type="datetimeFigureOut">
               <a:rPr lang="en-US" smtClean="0"/>
-              <a:t>2/17/2024</a:t>
+              <a:t>2/29/2024</a:t>
             </a:fld>
             <a:endParaRPr lang="en-US"/>
           </a:p>
@@ -1963,7 +1965,7 @@
           <a:p>
             <a:fld id="{539B29B4-1E10-4D34-85D0-CD777A4FEE39}" type="datetimeFigureOut">
               <a:rPr lang="en-US" smtClean="0"/>
-              <a:t>2/17/2024</a:t>
+              <a:t>2/29/2024</a:t>
             </a:fld>
             <a:endParaRPr lang="en-US"/>
           </a:p>
@@ -2076,7 +2078,7 @@
           <a:p>
             <a:fld id="{539B29B4-1E10-4D34-85D0-CD777A4FEE39}" type="datetimeFigureOut">
               <a:rPr lang="en-US" smtClean="0"/>
-              <a:t>2/17/2024</a:t>
+              <a:t>2/29/2024</a:t>
             </a:fld>
             <a:endParaRPr lang="en-US"/>
           </a:p>
@@ -2387,7 +2389,7 @@
           <a:p>
             <a:fld id="{539B29B4-1E10-4D34-85D0-CD777A4FEE39}" type="datetimeFigureOut">
               <a:rPr lang="en-US" smtClean="0"/>
-              <a:t>2/17/2024</a:t>
+              <a:t>2/29/2024</a:t>
             </a:fld>
             <a:endParaRPr lang="en-US"/>
           </a:p>
@@ -2675,7 +2677,7 @@
           <a:p>
             <a:fld id="{539B29B4-1E10-4D34-85D0-CD777A4FEE39}" type="datetimeFigureOut">
               <a:rPr lang="en-US" smtClean="0"/>
-              <a:t>2/17/2024</a:t>
+              <a:t>2/29/2024</a:t>
             </a:fld>
             <a:endParaRPr lang="en-US"/>
           </a:p>
@@ -2916,7 +2918,7 @@
           <a:p>
             <a:fld id="{539B29B4-1E10-4D34-85D0-CD777A4FEE39}" type="datetimeFigureOut">
               <a:rPr lang="en-US" smtClean="0"/>
-              <a:t>2/17/2024</a:t>
+              <a:t>2/29/2024</a:t>
             </a:fld>
             <a:endParaRPr lang="en-US"/>
           </a:p>
@@ -3707,7 +3709,1543 @@
 </p:sld>
 </file>
 
+<file path=ppt/slides/slide10.xml><?xml version="1.0" encoding="utf-8"?>
+<p:sld xmlns:a="http://schemas.openxmlformats.org/drawingml/2006/main" xmlns:r="http://schemas.openxmlformats.org/officeDocument/2006/relationships" xmlns:p="http://schemas.openxmlformats.org/presentationml/2006/main">
+  <p:cSld>
+    <p:spTree>
+      <p:nvGrpSpPr>
+        <p:cNvPr id="1" name=""/>
+        <p:cNvGrpSpPr/>
+        <p:nvPr/>
+      </p:nvGrpSpPr>
+      <p:grpSpPr>
+        <a:xfrm>
+          <a:off x="0" y="0"/>
+          <a:ext cx="0" cy="0"/>
+          <a:chOff x="0" y="0"/>
+          <a:chExt cx="0" cy="0"/>
+        </a:xfrm>
+      </p:grpSpPr>
+      <p:grpSp>
+        <p:nvGrpSpPr>
+          <p:cNvPr id="10" name="Group 9">
+            <a:extLst>
+              <a:ext uri="{FF2B5EF4-FFF2-40B4-BE49-F238E27FC236}">
+                <a16:creationId xmlns:a16="http://schemas.microsoft.com/office/drawing/2014/main" id="{FC7209A1-80F9-C978-275A-6DAE564D827E}"/>
+              </a:ext>
+            </a:extLst>
+          </p:cNvPr>
+          <p:cNvGrpSpPr/>
+          <p:nvPr/>
+        </p:nvGrpSpPr>
+        <p:grpSpPr>
+          <a:xfrm>
+            <a:off x="852487" y="236645"/>
+            <a:ext cx="10487025" cy="6554391"/>
+            <a:chOff x="852487" y="236645"/>
+            <a:chExt cx="10487025" cy="6554391"/>
+          </a:xfrm>
+        </p:grpSpPr>
+        <p:grpSp>
+          <p:nvGrpSpPr>
+            <p:cNvPr id="15" name="Group 14">
+              <a:extLst>
+                <a:ext uri="{FF2B5EF4-FFF2-40B4-BE49-F238E27FC236}">
+                  <a16:creationId xmlns:a16="http://schemas.microsoft.com/office/drawing/2014/main" id="{C16D5CEF-FCD7-C9E6-A62D-C7536D54C630}"/>
+                </a:ext>
+              </a:extLst>
+            </p:cNvPr>
+            <p:cNvGrpSpPr/>
+            <p:nvPr/>
+          </p:nvGrpSpPr>
+          <p:grpSpPr>
+            <a:xfrm>
+              <a:off x="852487" y="236645"/>
+              <a:ext cx="10487025" cy="6554391"/>
+              <a:chOff x="852487" y="236645"/>
+              <a:chExt cx="10487025" cy="6554391"/>
+            </a:xfrm>
+          </p:grpSpPr>
+          <p:grpSp>
+            <p:nvGrpSpPr>
+              <p:cNvPr id="4" name="Group 3">
+                <a:extLst>
+                  <a:ext uri="{FF2B5EF4-FFF2-40B4-BE49-F238E27FC236}">
+                    <a16:creationId xmlns:a16="http://schemas.microsoft.com/office/drawing/2014/main" id="{AE878858-C871-A6B1-771E-E414FCFC703B}"/>
+                  </a:ext>
+                </a:extLst>
+              </p:cNvPr>
+              <p:cNvGrpSpPr/>
+              <p:nvPr/>
+            </p:nvGrpSpPr>
+            <p:grpSpPr>
+              <a:xfrm>
+                <a:off x="852487" y="236645"/>
+                <a:ext cx="10487025" cy="6554391"/>
+                <a:chOff x="1030813" y="151804"/>
+                <a:chExt cx="10487025" cy="6554391"/>
+              </a:xfrm>
+            </p:grpSpPr>
+            <p:sp>
+              <p:nvSpPr>
+                <p:cNvPr id="5" name="Rectangle: Rounded Corners 4">
+                  <a:extLst>
+                    <a:ext uri="{FF2B5EF4-FFF2-40B4-BE49-F238E27FC236}">
+                      <a16:creationId xmlns:a16="http://schemas.microsoft.com/office/drawing/2014/main" id="{ACED6574-6C6E-3C72-A950-BA434E6B5FFB}"/>
+                    </a:ext>
+                  </a:extLst>
+                </p:cNvPr>
+                <p:cNvSpPr/>
+                <p:nvPr/>
+              </p:nvSpPr>
+              <p:spPr>
+                <a:xfrm>
+                  <a:off x="5037839" y="4766070"/>
+                  <a:ext cx="2248292" cy="651536"/>
+                </a:xfrm>
+                <a:prstGeom prst="roundRect">
+                  <a:avLst>
+                    <a:gd name="adj" fmla="val 50000"/>
+                  </a:avLst>
+                </a:prstGeom>
+              </p:spPr>
+              <p:style>
+                <a:lnRef idx="3">
+                  <a:schemeClr val="lt1"/>
+                </a:lnRef>
+                <a:fillRef idx="1">
+                  <a:schemeClr val="accent2"/>
+                </a:fillRef>
+                <a:effectRef idx="1">
+                  <a:schemeClr val="accent2"/>
+                </a:effectRef>
+                <a:fontRef idx="minor">
+                  <a:schemeClr val="lt1"/>
+                </a:fontRef>
+              </p:style>
+              <p:txBody>
+                <a:bodyPr rtlCol="0" anchor="ctr"/>
+                <a:lstStyle/>
+                <a:p>
+                  <a:pPr algn="ctr"/>
+                  <a:endParaRPr lang="en-US"/>
+                </a:p>
+              </p:txBody>
+            </p:sp>
+            <p:pic>
+              <p:nvPicPr>
+                <p:cNvPr id="7" name="Picture 6" descr="A video game poster with a city and a space ship">
+                  <a:extLst>
+                    <a:ext uri="{FF2B5EF4-FFF2-40B4-BE49-F238E27FC236}">
+                      <a16:creationId xmlns:a16="http://schemas.microsoft.com/office/drawing/2014/main" id="{9D52E824-A6D0-68BE-FC63-D3F91B0CA919}"/>
+                    </a:ext>
+                  </a:extLst>
+                </p:cNvPr>
+                <p:cNvPicPr>
+                  <a:picLocks noChangeAspect="1"/>
+                </p:cNvPicPr>
+                <p:nvPr/>
+              </p:nvPicPr>
+              <p:blipFill>
+                <a:blip r:embed="rId2">
+                  <a:extLst>
+                    <a:ext uri="{28A0092B-C50C-407E-A947-70E740481C1C}">
+                      <a14:useLocalDpi xmlns:a14="http://schemas.microsoft.com/office/drawing/2010/main" val="0"/>
+                    </a:ext>
+                  </a:extLst>
+                </a:blip>
+                <a:stretch>
+                  <a:fillRect/>
+                </a:stretch>
+              </p:blipFill>
+              <p:spPr>
+                <a:xfrm>
+                  <a:off x="1030813" y="151804"/>
+                  <a:ext cx="10487025" cy="6554391"/>
+                </a:xfrm>
+                <a:prstGeom prst="rect">
+                  <a:avLst/>
+                </a:prstGeom>
+              </p:spPr>
+            </p:pic>
+          </p:grpSp>
+          <p:sp>
+            <p:nvSpPr>
+              <p:cNvPr id="13" name="Multiplication Sign 12">
+                <a:extLst>
+                  <a:ext uri="{FF2B5EF4-FFF2-40B4-BE49-F238E27FC236}">
+                    <a16:creationId xmlns:a16="http://schemas.microsoft.com/office/drawing/2014/main" id="{C6982AE2-1854-5676-468A-8B93C380D298}"/>
+                  </a:ext>
+                </a:extLst>
+              </p:cNvPr>
+              <p:cNvSpPr/>
+              <p:nvPr/>
+            </p:nvSpPr>
+            <p:spPr>
+              <a:xfrm>
+                <a:off x="10573851" y="374466"/>
+                <a:ext cx="659876" cy="612742"/>
+              </a:xfrm>
+              <a:prstGeom prst="mathMultiply">
+                <a:avLst/>
+              </a:prstGeom>
+              <a:solidFill>
+                <a:srgbClr val="92D050"/>
+              </a:solidFill>
+            </p:spPr>
+            <p:style>
+              <a:lnRef idx="2">
+                <a:schemeClr val="accent1">
+                  <a:shade val="15000"/>
+                </a:schemeClr>
+              </a:lnRef>
+              <a:fillRef idx="1">
+                <a:schemeClr val="accent1"/>
+              </a:fillRef>
+              <a:effectRef idx="0">
+                <a:schemeClr val="accent1"/>
+              </a:effectRef>
+              <a:fontRef idx="minor">
+                <a:schemeClr val="lt1"/>
+              </a:fontRef>
+            </p:style>
+            <p:txBody>
+              <a:bodyPr rtlCol="0" anchor="ctr"/>
+              <a:lstStyle/>
+              <a:p>
+                <a:pPr algn="ctr"/>
+                <a:endParaRPr lang="en-US"/>
+              </a:p>
+            </p:txBody>
+          </p:sp>
+          <p:sp>
+            <p:nvSpPr>
+              <p:cNvPr id="14" name="Rectangle 13">
+                <a:extLst>
+                  <a:ext uri="{FF2B5EF4-FFF2-40B4-BE49-F238E27FC236}">
+                    <a16:creationId xmlns:a16="http://schemas.microsoft.com/office/drawing/2014/main" id="{A9F9FEC6-04A6-FD1D-1918-9D980A9AC9FF}"/>
+                  </a:ext>
+                </a:extLst>
+              </p:cNvPr>
+              <p:cNvSpPr/>
+              <p:nvPr/>
+            </p:nvSpPr>
+            <p:spPr>
+              <a:xfrm>
+                <a:off x="5065059" y="4087906"/>
+                <a:ext cx="2248292" cy="651536"/>
+              </a:xfrm>
+              <a:prstGeom prst="rect">
+                <a:avLst/>
+              </a:prstGeom>
+            </p:spPr>
+            <p:style>
+              <a:lnRef idx="2">
+                <a:schemeClr val="accent1">
+                  <a:shade val="15000"/>
+                </a:schemeClr>
+              </a:lnRef>
+              <a:fillRef idx="1">
+                <a:schemeClr val="accent1"/>
+              </a:fillRef>
+              <a:effectRef idx="0">
+                <a:schemeClr val="accent1"/>
+              </a:effectRef>
+              <a:fontRef idx="minor">
+                <a:schemeClr val="lt1"/>
+              </a:fontRef>
+            </p:style>
+            <p:txBody>
+              <a:bodyPr rtlCol="0" anchor="ctr"/>
+              <a:lstStyle/>
+              <a:p>
+                <a:pPr algn="ctr"/>
+                <a:r>
+                  <a:rPr lang="en-US" dirty="0"/>
+                  <a:t>HIGH SCORES</a:t>
+                </a:r>
+              </a:p>
+            </p:txBody>
+          </p:sp>
+        </p:grpSp>
+        <p:sp>
+          <p:nvSpPr>
+            <p:cNvPr id="2" name="TextBox 1">
+              <a:extLst>
+                <a:ext uri="{FF2B5EF4-FFF2-40B4-BE49-F238E27FC236}">
+                  <a16:creationId xmlns:a16="http://schemas.microsoft.com/office/drawing/2014/main" id="{276D07EC-8EAA-F807-B6D2-805DE6D29F75}"/>
+                </a:ext>
+              </a:extLst>
+            </p:cNvPr>
+            <p:cNvSpPr txBox="1"/>
+            <p:nvPr/>
+          </p:nvSpPr>
+          <p:spPr>
+            <a:xfrm>
+              <a:off x="5396753" y="4807347"/>
+              <a:ext cx="373820" cy="369332"/>
+            </a:xfrm>
+            <a:prstGeom prst="rect">
+              <a:avLst/>
+            </a:prstGeom>
+            <a:noFill/>
+          </p:spPr>
+          <p:txBody>
+            <a:bodyPr wrap="none" rtlCol="0">
+              <a:spAutoFit/>
+            </a:bodyPr>
+            <a:lstStyle/>
+            <a:p>
+              <a:r>
+                <a:rPr lang="en-US" dirty="0"/>
+                <a:t>1.</a:t>
+              </a:r>
+            </a:p>
+          </p:txBody>
+        </p:sp>
+        <p:sp>
+          <p:nvSpPr>
+            <p:cNvPr id="3" name="TextBox 2">
+              <a:extLst>
+                <a:ext uri="{FF2B5EF4-FFF2-40B4-BE49-F238E27FC236}">
+                  <a16:creationId xmlns:a16="http://schemas.microsoft.com/office/drawing/2014/main" id="{4DEA157F-3AFD-BDFC-6FF4-93718A56C114}"/>
+                </a:ext>
+              </a:extLst>
+            </p:cNvPr>
+            <p:cNvSpPr txBox="1"/>
+            <p:nvPr/>
+          </p:nvSpPr>
+          <p:spPr>
+            <a:xfrm>
+              <a:off x="5396753" y="5131136"/>
+              <a:ext cx="373820" cy="369332"/>
+            </a:xfrm>
+            <a:prstGeom prst="rect">
+              <a:avLst/>
+            </a:prstGeom>
+            <a:noFill/>
+          </p:spPr>
+          <p:txBody>
+            <a:bodyPr wrap="none" rtlCol="0">
+              <a:spAutoFit/>
+            </a:bodyPr>
+            <a:lstStyle/>
+            <a:p>
+              <a:r>
+                <a:rPr lang="en-US" dirty="0"/>
+                <a:t>2.</a:t>
+              </a:r>
+            </a:p>
+          </p:txBody>
+        </p:sp>
+        <p:sp>
+          <p:nvSpPr>
+            <p:cNvPr id="6" name="TextBox 5">
+              <a:extLst>
+                <a:ext uri="{FF2B5EF4-FFF2-40B4-BE49-F238E27FC236}">
+                  <a16:creationId xmlns:a16="http://schemas.microsoft.com/office/drawing/2014/main" id="{2FA40C92-8860-FF8B-65FE-D438CD83F4E1}"/>
+                </a:ext>
+              </a:extLst>
+            </p:cNvPr>
+            <p:cNvSpPr txBox="1"/>
+            <p:nvPr/>
+          </p:nvSpPr>
+          <p:spPr>
+            <a:xfrm>
+              <a:off x="5396753" y="5451641"/>
+              <a:ext cx="373820" cy="369332"/>
+            </a:xfrm>
+            <a:prstGeom prst="rect">
+              <a:avLst/>
+            </a:prstGeom>
+            <a:noFill/>
+          </p:spPr>
+          <p:txBody>
+            <a:bodyPr wrap="none" rtlCol="0">
+              <a:spAutoFit/>
+            </a:bodyPr>
+            <a:lstStyle/>
+            <a:p>
+              <a:r>
+                <a:rPr lang="en-US" dirty="0"/>
+                <a:t>3.</a:t>
+              </a:r>
+            </a:p>
+          </p:txBody>
+        </p:sp>
+        <p:sp>
+          <p:nvSpPr>
+            <p:cNvPr id="8" name="TextBox 7">
+              <a:extLst>
+                <a:ext uri="{FF2B5EF4-FFF2-40B4-BE49-F238E27FC236}">
+                  <a16:creationId xmlns:a16="http://schemas.microsoft.com/office/drawing/2014/main" id="{89409CE6-5FFA-74F2-17AA-6F5EB31EE0C8}"/>
+                </a:ext>
+              </a:extLst>
+            </p:cNvPr>
+            <p:cNvSpPr txBox="1"/>
+            <p:nvPr/>
+          </p:nvSpPr>
+          <p:spPr>
+            <a:xfrm>
+              <a:off x="5396753" y="5820973"/>
+              <a:ext cx="373820" cy="369332"/>
+            </a:xfrm>
+            <a:prstGeom prst="rect">
+              <a:avLst/>
+            </a:prstGeom>
+            <a:noFill/>
+          </p:spPr>
+          <p:txBody>
+            <a:bodyPr wrap="none" rtlCol="0">
+              <a:spAutoFit/>
+            </a:bodyPr>
+            <a:lstStyle/>
+            <a:p>
+              <a:r>
+                <a:rPr lang="en-US" dirty="0"/>
+                <a:t>4.</a:t>
+              </a:r>
+            </a:p>
+          </p:txBody>
+        </p:sp>
+        <p:sp>
+          <p:nvSpPr>
+            <p:cNvPr id="9" name="TextBox 8">
+              <a:extLst>
+                <a:ext uri="{FF2B5EF4-FFF2-40B4-BE49-F238E27FC236}">
+                  <a16:creationId xmlns:a16="http://schemas.microsoft.com/office/drawing/2014/main" id="{E9717A5B-FEBF-E25C-3804-A1D4CE0E6306}"/>
+                </a:ext>
+              </a:extLst>
+            </p:cNvPr>
+            <p:cNvSpPr txBox="1"/>
+            <p:nvPr/>
+          </p:nvSpPr>
+          <p:spPr>
+            <a:xfrm>
+              <a:off x="5396753" y="6149067"/>
+              <a:ext cx="373820" cy="369332"/>
+            </a:xfrm>
+            <a:prstGeom prst="rect">
+              <a:avLst/>
+            </a:prstGeom>
+            <a:noFill/>
+          </p:spPr>
+          <p:txBody>
+            <a:bodyPr wrap="none" rtlCol="0">
+              <a:spAutoFit/>
+            </a:bodyPr>
+            <a:lstStyle/>
+            <a:p>
+              <a:r>
+                <a:rPr lang="en-US" dirty="0"/>
+                <a:t>5.</a:t>
+              </a:r>
+            </a:p>
+          </p:txBody>
+        </p:sp>
+      </p:grpSp>
+    </p:spTree>
+    <p:extLst>
+      <p:ext uri="{BB962C8B-B14F-4D97-AF65-F5344CB8AC3E}">
+        <p14:creationId xmlns:p14="http://schemas.microsoft.com/office/powerpoint/2010/main" val="1853303283"/>
+      </p:ext>
+    </p:extLst>
+  </p:cSld>
+  <p:clrMapOvr>
+    <a:masterClrMapping/>
+  </p:clrMapOvr>
+</p:sld>
+</file>
+
 <file path=ppt/slides/slide2.xml><?xml version="1.0" encoding="utf-8"?>
+<p:sld xmlns:a="http://schemas.openxmlformats.org/drawingml/2006/main" xmlns:r="http://schemas.openxmlformats.org/officeDocument/2006/relationships" xmlns:p="http://schemas.openxmlformats.org/presentationml/2006/main">
+  <p:cSld>
+    <p:spTree>
+      <p:nvGrpSpPr>
+        <p:cNvPr id="1" name=""/>
+        <p:cNvGrpSpPr/>
+        <p:nvPr/>
+      </p:nvGrpSpPr>
+      <p:grpSpPr>
+        <a:xfrm>
+          <a:off x="0" y="0"/>
+          <a:ext cx="0" cy="0"/>
+          <a:chOff x="0" y="0"/>
+          <a:chExt cx="0" cy="0"/>
+        </a:xfrm>
+      </p:grpSpPr>
+      <p:grpSp>
+        <p:nvGrpSpPr>
+          <p:cNvPr id="18" name="Group 17">
+            <a:extLst>
+              <a:ext uri="{FF2B5EF4-FFF2-40B4-BE49-F238E27FC236}">
+                <a16:creationId xmlns:a16="http://schemas.microsoft.com/office/drawing/2014/main" id="{50B8C9DA-7851-6600-2B05-3D2F5FCEDF6F}"/>
+              </a:ext>
+            </a:extLst>
+          </p:cNvPr>
+          <p:cNvGrpSpPr/>
+          <p:nvPr/>
+        </p:nvGrpSpPr>
+        <p:grpSpPr>
+          <a:xfrm>
+            <a:off x="852487" y="236645"/>
+            <a:ext cx="10487025" cy="6554391"/>
+            <a:chOff x="852487" y="236645"/>
+            <a:chExt cx="10487025" cy="6554391"/>
+          </a:xfrm>
+        </p:grpSpPr>
+        <p:grpSp>
+          <p:nvGrpSpPr>
+            <p:cNvPr id="4" name="Group 3">
+              <a:extLst>
+                <a:ext uri="{FF2B5EF4-FFF2-40B4-BE49-F238E27FC236}">
+                  <a16:creationId xmlns:a16="http://schemas.microsoft.com/office/drawing/2014/main" id="{93C4DFB7-0C99-D2EE-07B8-7D4AF9AD68C8}"/>
+                </a:ext>
+              </a:extLst>
+            </p:cNvPr>
+            <p:cNvGrpSpPr/>
+            <p:nvPr/>
+          </p:nvGrpSpPr>
+          <p:grpSpPr>
+            <a:xfrm>
+              <a:off x="852487" y="236645"/>
+              <a:ext cx="10487025" cy="6554391"/>
+              <a:chOff x="1030813" y="151804"/>
+              <a:chExt cx="10487025" cy="6554391"/>
+            </a:xfrm>
+          </p:grpSpPr>
+          <p:sp>
+            <p:nvSpPr>
+              <p:cNvPr id="5" name="Rectangle: Rounded Corners 4">
+                <a:extLst>
+                  <a:ext uri="{FF2B5EF4-FFF2-40B4-BE49-F238E27FC236}">
+                    <a16:creationId xmlns:a16="http://schemas.microsoft.com/office/drawing/2014/main" id="{62C9D81A-25C9-B77D-87AA-A1D22EA95763}"/>
+                  </a:ext>
+                </a:extLst>
+              </p:cNvPr>
+              <p:cNvSpPr/>
+              <p:nvPr/>
+            </p:nvSpPr>
+            <p:spPr>
+              <a:xfrm>
+                <a:off x="5037839" y="4766070"/>
+                <a:ext cx="2248292" cy="651536"/>
+              </a:xfrm>
+              <a:prstGeom prst="roundRect">
+                <a:avLst>
+                  <a:gd name="adj" fmla="val 50000"/>
+                </a:avLst>
+              </a:prstGeom>
+            </p:spPr>
+            <p:style>
+              <a:lnRef idx="3">
+                <a:schemeClr val="lt1"/>
+              </a:lnRef>
+              <a:fillRef idx="1">
+                <a:schemeClr val="accent2"/>
+              </a:fillRef>
+              <a:effectRef idx="1">
+                <a:schemeClr val="accent2"/>
+              </a:effectRef>
+              <a:fontRef idx="minor">
+                <a:schemeClr val="lt1"/>
+              </a:fontRef>
+            </p:style>
+            <p:txBody>
+              <a:bodyPr rtlCol="0" anchor="ctr"/>
+              <a:lstStyle/>
+              <a:p>
+                <a:pPr algn="ctr"/>
+                <a:endParaRPr lang="en-US"/>
+              </a:p>
+            </p:txBody>
+          </p:sp>
+          <p:grpSp>
+            <p:nvGrpSpPr>
+              <p:cNvPr id="6" name="Group 5">
+                <a:extLst>
+                  <a:ext uri="{FF2B5EF4-FFF2-40B4-BE49-F238E27FC236}">
+                    <a16:creationId xmlns:a16="http://schemas.microsoft.com/office/drawing/2014/main" id="{F670A535-EA0A-D6F9-F512-C0D5B8E41B63}"/>
+                  </a:ext>
+                </a:extLst>
+              </p:cNvPr>
+              <p:cNvGrpSpPr/>
+              <p:nvPr/>
+            </p:nvGrpSpPr>
+            <p:grpSpPr>
+              <a:xfrm>
+                <a:off x="1030813" y="151804"/>
+                <a:ext cx="10487025" cy="6554391"/>
+                <a:chOff x="5457481" y="1814642"/>
+                <a:chExt cx="10487025" cy="6554391"/>
+              </a:xfrm>
+            </p:grpSpPr>
+            <p:pic>
+              <p:nvPicPr>
+                <p:cNvPr id="7" name="Picture 6" descr="A video game poster with a city and a space ship">
+                  <a:extLst>
+                    <a:ext uri="{FF2B5EF4-FFF2-40B4-BE49-F238E27FC236}">
+                      <a16:creationId xmlns:a16="http://schemas.microsoft.com/office/drawing/2014/main" id="{67D2FF15-0DF8-8ED1-552D-C00763CFD35F}"/>
+                    </a:ext>
+                  </a:extLst>
+                </p:cNvPr>
+                <p:cNvPicPr>
+                  <a:picLocks noChangeAspect="1"/>
+                </p:cNvPicPr>
+                <p:nvPr/>
+              </p:nvPicPr>
+              <p:blipFill>
+                <a:blip r:embed="rId2">
+                  <a:extLst>
+                    <a:ext uri="{28A0092B-C50C-407E-A947-70E740481C1C}">
+                      <a14:useLocalDpi xmlns:a14="http://schemas.microsoft.com/office/drawing/2010/main" val="0"/>
+                    </a:ext>
+                  </a:extLst>
+                </a:blip>
+                <a:stretch>
+                  <a:fillRect/>
+                </a:stretch>
+              </p:blipFill>
+              <p:spPr>
+                <a:xfrm>
+                  <a:off x="5457481" y="1814642"/>
+                  <a:ext cx="10487025" cy="6554391"/>
+                </a:xfrm>
+                <a:prstGeom prst="rect">
+                  <a:avLst/>
+                </a:prstGeom>
+              </p:spPr>
+            </p:pic>
+            <p:grpSp>
+              <p:nvGrpSpPr>
+                <p:cNvPr id="8" name="Group 7">
+                  <a:extLst>
+                    <a:ext uri="{FF2B5EF4-FFF2-40B4-BE49-F238E27FC236}">
+                      <a16:creationId xmlns:a16="http://schemas.microsoft.com/office/drawing/2014/main" id="{91CBF708-0EAB-E1C0-EDA6-9D5DB3672F5E}"/>
+                    </a:ext>
+                  </a:extLst>
+                </p:cNvPr>
+                <p:cNvGrpSpPr/>
+                <p:nvPr/>
+              </p:nvGrpSpPr>
+              <p:grpSpPr>
+                <a:xfrm>
+                  <a:off x="8561105" y="5942126"/>
+                  <a:ext cx="4167435" cy="2134491"/>
+                  <a:chOff x="8429132" y="5320422"/>
+                  <a:chExt cx="4167435" cy="2134491"/>
+                </a:xfrm>
+              </p:grpSpPr>
+              <p:sp>
+                <p:nvSpPr>
+                  <p:cNvPr id="9" name="Rectangle: Rounded Corners 8">
+                    <a:extLst>
+                      <a:ext uri="{FF2B5EF4-FFF2-40B4-BE49-F238E27FC236}">
+                        <a16:creationId xmlns:a16="http://schemas.microsoft.com/office/drawing/2014/main" id="{ECA182CD-F8A1-391B-D297-792DDEC7F0E1}"/>
+                      </a:ext>
+                    </a:extLst>
+                  </p:cNvPr>
+                  <p:cNvSpPr/>
+                  <p:nvPr/>
+                </p:nvSpPr>
+                <p:spPr>
+                  <a:xfrm>
+                    <a:off x="9444874" y="5320422"/>
+                    <a:ext cx="2248292" cy="651536"/>
+                  </a:xfrm>
+                  <a:prstGeom prst="roundRect">
+                    <a:avLst>
+                      <a:gd name="adj" fmla="val 50000"/>
+                    </a:avLst>
+                  </a:prstGeom>
+                </p:spPr>
+                <p:style>
+                  <a:lnRef idx="3">
+                    <a:schemeClr val="lt1"/>
+                  </a:lnRef>
+                  <a:fillRef idx="1">
+                    <a:schemeClr val="accent2"/>
+                  </a:fillRef>
+                  <a:effectRef idx="1">
+                    <a:schemeClr val="accent2"/>
+                  </a:effectRef>
+                  <a:fontRef idx="minor">
+                    <a:schemeClr val="lt1"/>
+                  </a:fontRef>
+                </p:style>
+                <p:txBody>
+                  <a:bodyPr rtlCol="0" anchor="ctr"/>
+                  <a:lstStyle/>
+                  <a:p>
+                    <a:pPr algn="ctr"/>
+                    <a:r>
+                      <a:rPr lang="en-US" dirty="0">
+                        <a:solidFill>
+                          <a:srgbClr val="1C1E1D"/>
+                        </a:solidFill>
+                        <a:latin typeface="Cooper Black" panose="0208090404030B020404" pitchFamily="18" charset="0"/>
+                      </a:rPr>
+                      <a:t>START</a:t>
+                    </a:r>
+                  </a:p>
+                </p:txBody>
+              </p:sp>
+              <p:sp>
+                <p:nvSpPr>
+                  <p:cNvPr id="10" name="Rectangle: Rounded Corners 9">
+                    <a:extLst>
+                      <a:ext uri="{FF2B5EF4-FFF2-40B4-BE49-F238E27FC236}">
+                        <a16:creationId xmlns:a16="http://schemas.microsoft.com/office/drawing/2014/main" id="{86EBC218-1A96-AEFC-D0B9-3F0D45E07E9B}"/>
+                      </a:ext>
+                    </a:extLst>
+                  </p:cNvPr>
+                  <p:cNvSpPr/>
+                  <p:nvPr/>
+                </p:nvSpPr>
+                <p:spPr>
+                  <a:xfrm>
+                    <a:off x="8429132" y="6158179"/>
+                    <a:ext cx="1806803" cy="600159"/>
+                  </a:xfrm>
+                  <a:prstGeom prst="roundRect">
+                    <a:avLst>
+                      <a:gd name="adj" fmla="val 50000"/>
+                    </a:avLst>
+                  </a:prstGeom>
+                </p:spPr>
+                <p:style>
+                  <a:lnRef idx="3">
+                    <a:schemeClr val="lt1"/>
+                  </a:lnRef>
+                  <a:fillRef idx="1">
+                    <a:schemeClr val="accent2"/>
+                  </a:fillRef>
+                  <a:effectRef idx="1">
+                    <a:schemeClr val="accent2"/>
+                  </a:effectRef>
+                  <a:fontRef idx="minor">
+                    <a:schemeClr val="lt1"/>
+                  </a:fontRef>
+                </p:style>
+                <p:txBody>
+                  <a:bodyPr rtlCol="0" anchor="ctr"/>
+                  <a:lstStyle/>
+                  <a:p>
+                    <a:pPr algn="ctr"/>
+                    <a:r>
+                      <a:rPr lang="en-US" dirty="0">
+                        <a:solidFill>
+                          <a:srgbClr val="1C1E1D"/>
+                        </a:solidFill>
+                        <a:latin typeface="Cooper Black" panose="0208090404030B020404" pitchFamily="18" charset="0"/>
+                      </a:rPr>
+                      <a:t>SCORES</a:t>
+                    </a:r>
+                  </a:p>
+                </p:txBody>
+              </p:sp>
+              <p:sp>
+                <p:nvSpPr>
+                  <p:cNvPr id="11" name="Rectangle: Rounded Corners 10">
+                    <a:extLst>
+                      <a:ext uri="{FF2B5EF4-FFF2-40B4-BE49-F238E27FC236}">
+                        <a16:creationId xmlns:a16="http://schemas.microsoft.com/office/drawing/2014/main" id="{ADF68460-4C6F-D7CB-A633-BA2060183309}"/>
+                      </a:ext>
+                    </a:extLst>
+                  </p:cNvPr>
+                  <p:cNvSpPr/>
+                  <p:nvPr/>
+                </p:nvSpPr>
+                <p:spPr>
+                  <a:xfrm>
+                    <a:off x="10789764" y="6158660"/>
+                    <a:ext cx="1806803" cy="600159"/>
+                  </a:xfrm>
+                  <a:prstGeom prst="roundRect">
+                    <a:avLst>
+                      <a:gd name="adj" fmla="val 50000"/>
+                    </a:avLst>
+                  </a:prstGeom>
+                </p:spPr>
+                <p:style>
+                  <a:lnRef idx="3">
+                    <a:schemeClr val="lt1"/>
+                  </a:lnRef>
+                  <a:fillRef idx="1">
+                    <a:schemeClr val="accent2"/>
+                  </a:fillRef>
+                  <a:effectRef idx="1">
+                    <a:schemeClr val="accent2"/>
+                  </a:effectRef>
+                  <a:fontRef idx="minor">
+                    <a:schemeClr val="lt1"/>
+                  </a:fontRef>
+                </p:style>
+                <p:txBody>
+                  <a:bodyPr rtlCol="0" anchor="ctr"/>
+                  <a:lstStyle/>
+                  <a:p>
+                    <a:pPr algn="ctr"/>
+                    <a:r>
+                      <a:rPr lang="en-US" dirty="0">
+                        <a:solidFill>
+                          <a:srgbClr val="1C1E1D"/>
+                        </a:solidFill>
+                        <a:latin typeface="Cooper Black" panose="0208090404030B020404" pitchFamily="18" charset="0"/>
+                      </a:rPr>
+                      <a:t>SETTINGS</a:t>
+                    </a:r>
+                  </a:p>
+                </p:txBody>
+              </p:sp>
+              <p:sp>
+                <p:nvSpPr>
+                  <p:cNvPr id="12" name="Rectangle: Rounded Corners 11">
+                    <a:extLst>
+                      <a:ext uri="{FF2B5EF4-FFF2-40B4-BE49-F238E27FC236}">
+                        <a16:creationId xmlns:a16="http://schemas.microsoft.com/office/drawing/2014/main" id="{AFB68E33-022F-4659-8C6F-C21C52A620D8}"/>
+                      </a:ext>
+                    </a:extLst>
+                  </p:cNvPr>
+                  <p:cNvSpPr/>
+                  <p:nvPr/>
+                </p:nvSpPr>
+                <p:spPr>
+                  <a:xfrm>
+                    <a:off x="9842879" y="6944559"/>
+                    <a:ext cx="1239295" cy="510354"/>
+                  </a:xfrm>
+                  <a:prstGeom prst="roundRect">
+                    <a:avLst>
+                      <a:gd name="adj" fmla="val 50000"/>
+                    </a:avLst>
+                  </a:prstGeom>
+                </p:spPr>
+                <p:style>
+                  <a:lnRef idx="3">
+                    <a:schemeClr val="lt1"/>
+                  </a:lnRef>
+                  <a:fillRef idx="1">
+                    <a:schemeClr val="accent2"/>
+                  </a:fillRef>
+                  <a:effectRef idx="1">
+                    <a:schemeClr val="accent2"/>
+                  </a:effectRef>
+                  <a:fontRef idx="minor">
+                    <a:schemeClr val="lt1"/>
+                  </a:fontRef>
+                </p:style>
+                <p:txBody>
+                  <a:bodyPr rtlCol="0" anchor="ctr"/>
+                  <a:lstStyle/>
+                  <a:p>
+                    <a:pPr algn="ctr"/>
+                    <a:r>
+                      <a:rPr lang="en-US" dirty="0">
+                        <a:solidFill>
+                          <a:srgbClr val="1C1E1D"/>
+                        </a:solidFill>
+                        <a:latin typeface="Cooper Black" panose="0208090404030B020404" pitchFamily="18" charset="0"/>
+                      </a:rPr>
+                      <a:t>EXIT</a:t>
+                    </a:r>
+                  </a:p>
+                </p:txBody>
+              </p:sp>
+            </p:grpSp>
+          </p:grpSp>
+        </p:grpSp>
+        <p:sp>
+          <p:nvSpPr>
+            <p:cNvPr id="17" name="Rectangle 16">
+              <a:extLst>
+                <a:ext uri="{FF2B5EF4-FFF2-40B4-BE49-F238E27FC236}">
+                  <a16:creationId xmlns:a16="http://schemas.microsoft.com/office/drawing/2014/main" id="{3DB62092-CC4E-2B9F-F12D-F33FCF689AF3}"/>
+                </a:ext>
+              </a:extLst>
+            </p:cNvPr>
+            <p:cNvSpPr/>
+            <p:nvPr/>
+          </p:nvSpPr>
+          <p:spPr>
+            <a:xfrm>
+              <a:off x="2420795" y="5802045"/>
+              <a:ext cx="789588" cy="868256"/>
+            </a:xfrm>
+            <a:prstGeom prst="rect">
+              <a:avLst/>
+            </a:prstGeom>
+            <a:solidFill>
+              <a:schemeClr val="tx2">
+                <a:lumMod val="50000"/>
+                <a:lumOff val="50000"/>
+              </a:schemeClr>
+            </a:solidFill>
+            <a:ln>
+              <a:solidFill>
+                <a:schemeClr val="tx2">
+                  <a:lumMod val="25000"/>
+                  <a:lumOff val="75000"/>
+                </a:schemeClr>
+              </a:solidFill>
+            </a:ln>
+          </p:spPr>
+          <p:style>
+            <a:lnRef idx="2">
+              <a:schemeClr val="accent1">
+                <a:shade val="15000"/>
+              </a:schemeClr>
+            </a:lnRef>
+            <a:fillRef idx="1">
+              <a:schemeClr val="accent1"/>
+            </a:fillRef>
+            <a:effectRef idx="0">
+              <a:schemeClr val="accent1"/>
+            </a:effectRef>
+            <a:fontRef idx="minor">
+              <a:schemeClr val="lt1"/>
+            </a:fontRef>
+          </p:style>
+          <p:txBody>
+            <a:bodyPr rtlCol="0" anchor="ctr"/>
+            <a:lstStyle/>
+            <a:p>
+              <a:pPr algn="ctr"/>
+              <a:endParaRPr lang="en-US" dirty="0"/>
+            </a:p>
+          </p:txBody>
+        </p:sp>
+        <p:pic>
+          <p:nvPicPr>
+            <p:cNvPr id="16" name="Picture 15" descr="A blue and yellow space ship&#10;&#10;Description automatically generated">
+              <a:extLst>
+                <a:ext uri="{FF2B5EF4-FFF2-40B4-BE49-F238E27FC236}">
+                  <a16:creationId xmlns:a16="http://schemas.microsoft.com/office/drawing/2014/main" id="{0F910037-CEA9-77F9-453C-C75D2E0C84F7}"/>
+                </a:ext>
+              </a:extLst>
+            </p:cNvPr>
+            <p:cNvPicPr>
+              <a:picLocks noChangeAspect="1"/>
+            </p:cNvPicPr>
+            <p:nvPr/>
+          </p:nvPicPr>
+          <p:blipFill>
+            <a:blip r:embed="rId3">
+              <a:extLst>
+                <a:ext uri="{28A0092B-C50C-407E-A947-70E740481C1C}">
+                  <a14:useLocalDpi xmlns:a14="http://schemas.microsoft.com/office/drawing/2010/main" val="0"/>
+                </a:ext>
+              </a:extLst>
+            </a:blip>
+            <a:stretch>
+              <a:fillRect/>
+            </a:stretch>
+          </p:blipFill>
+          <p:spPr>
+            <a:xfrm>
+              <a:off x="2436707" y="5863591"/>
+              <a:ext cx="757764" cy="757764"/>
+            </a:xfrm>
+            <a:prstGeom prst="rect">
+              <a:avLst/>
+            </a:prstGeom>
+          </p:spPr>
+        </p:pic>
+        <p:pic>
+          <p:nvPicPr>
+            <p:cNvPr id="14" name="Picture 13" descr="A blue and white spaceship&#10;&#10;Description automatically generated">
+              <a:extLst>
+                <a:ext uri="{FF2B5EF4-FFF2-40B4-BE49-F238E27FC236}">
+                  <a16:creationId xmlns:a16="http://schemas.microsoft.com/office/drawing/2014/main" id="{067C6C1A-BDB9-D9B9-2056-1C24FE1DBA18}"/>
+                </a:ext>
+              </a:extLst>
+            </p:cNvPr>
+            <p:cNvPicPr>
+              <a:picLocks noChangeAspect="1"/>
+            </p:cNvPicPr>
+            <p:nvPr/>
+          </p:nvPicPr>
+          <p:blipFill>
+            <a:blip r:embed="rId4">
+              <a:extLst>
+                <a:ext uri="{28A0092B-C50C-407E-A947-70E740481C1C}">
+                  <a14:useLocalDpi xmlns:a14="http://schemas.microsoft.com/office/drawing/2010/main" val="0"/>
+                </a:ext>
+              </a:extLst>
+            </a:blip>
+            <a:stretch>
+              <a:fillRect/>
+            </a:stretch>
+          </p:blipFill>
+          <p:spPr>
+            <a:xfrm>
+              <a:off x="1458880" y="5857291"/>
+              <a:ext cx="757764" cy="757764"/>
+            </a:xfrm>
+            <a:prstGeom prst="rect">
+              <a:avLst/>
+            </a:prstGeom>
+          </p:spPr>
+        </p:pic>
+      </p:grpSp>
+    </p:spTree>
+    <p:extLst>
+      <p:ext uri="{BB962C8B-B14F-4D97-AF65-F5344CB8AC3E}">
+        <p14:creationId xmlns:p14="http://schemas.microsoft.com/office/powerpoint/2010/main" val="1576470405"/>
+      </p:ext>
+    </p:extLst>
+  </p:cSld>
+  <p:clrMapOvr>
+    <a:masterClrMapping/>
+  </p:clrMapOvr>
+</p:sld>
+</file>
+
+<file path=ppt/slides/slide3.xml><?xml version="1.0" encoding="utf-8"?>
+<p:sld xmlns:a="http://schemas.openxmlformats.org/drawingml/2006/main" xmlns:r="http://schemas.openxmlformats.org/officeDocument/2006/relationships" xmlns:p="http://schemas.openxmlformats.org/presentationml/2006/main">
+  <p:cSld>
+    <p:spTree>
+      <p:nvGrpSpPr>
+        <p:cNvPr id="1" name=""/>
+        <p:cNvGrpSpPr/>
+        <p:nvPr/>
+      </p:nvGrpSpPr>
+      <p:grpSpPr>
+        <a:xfrm>
+          <a:off x="0" y="0"/>
+          <a:ext cx="0" cy="0"/>
+          <a:chOff x="0" y="0"/>
+          <a:chExt cx="0" cy="0"/>
+        </a:xfrm>
+      </p:grpSpPr>
+      <p:grpSp>
+        <p:nvGrpSpPr>
+          <p:cNvPr id="17" name="Group 16">
+            <a:extLst>
+              <a:ext uri="{FF2B5EF4-FFF2-40B4-BE49-F238E27FC236}">
+                <a16:creationId xmlns:a16="http://schemas.microsoft.com/office/drawing/2014/main" id="{1B4ACCC8-0208-003D-446B-3C55591ADD0B}"/>
+              </a:ext>
+            </a:extLst>
+          </p:cNvPr>
+          <p:cNvGrpSpPr/>
+          <p:nvPr/>
+        </p:nvGrpSpPr>
+        <p:grpSpPr>
+          <a:xfrm>
+            <a:off x="852487" y="236645"/>
+            <a:ext cx="10487025" cy="6554391"/>
+            <a:chOff x="852487" y="236645"/>
+            <a:chExt cx="10487025" cy="6554391"/>
+          </a:xfrm>
+        </p:grpSpPr>
+        <p:grpSp>
+          <p:nvGrpSpPr>
+            <p:cNvPr id="18" name="Group 17">
+              <a:extLst>
+                <a:ext uri="{FF2B5EF4-FFF2-40B4-BE49-F238E27FC236}">
+                  <a16:creationId xmlns:a16="http://schemas.microsoft.com/office/drawing/2014/main" id="{DA0C692A-E5D7-CD13-817D-658006C48BE0}"/>
+                </a:ext>
+              </a:extLst>
+            </p:cNvPr>
+            <p:cNvGrpSpPr/>
+            <p:nvPr/>
+          </p:nvGrpSpPr>
+          <p:grpSpPr>
+            <a:xfrm>
+              <a:off x="852487" y="236645"/>
+              <a:ext cx="10487025" cy="6554391"/>
+              <a:chOff x="1030813" y="151804"/>
+              <a:chExt cx="10487025" cy="6554391"/>
+            </a:xfrm>
+          </p:grpSpPr>
+          <p:sp>
+            <p:nvSpPr>
+              <p:cNvPr id="22" name="Rectangle: Rounded Corners 21">
+                <a:extLst>
+                  <a:ext uri="{FF2B5EF4-FFF2-40B4-BE49-F238E27FC236}">
+                    <a16:creationId xmlns:a16="http://schemas.microsoft.com/office/drawing/2014/main" id="{58BA3D04-C407-3E21-F48D-099944C006C8}"/>
+                  </a:ext>
+                </a:extLst>
+              </p:cNvPr>
+              <p:cNvSpPr/>
+              <p:nvPr/>
+            </p:nvSpPr>
+            <p:spPr>
+              <a:xfrm>
+                <a:off x="5037839" y="4766070"/>
+                <a:ext cx="2248292" cy="651536"/>
+              </a:xfrm>
+              <a:prstGeom prst="roundRect">
+                <a:avLst>
+                  <a:gd name="adj" fmla="val 50000"/>
+                </a:avLst>
+              </a:prstGeom>
+            </p:spPr>
+            <p:style>
+              <a:lnRef idx="3">
+                <a:schemeClr val="lt1"/>
+              </a:lnRef>
+              <a:fillRef idx="1">
+                <a:schemeClr val="accent2"/>
+              </a:fillRef>
+              <a:effectRef idx="1">
+                <a:schemeClr val="accent2"/>
+              </a:effectRef>
+              <a:fontRef idx="minor">
+                <a:schemeClr val="lt1"/>
+              </a:fontRef>
+            </p:style>
+            <p:txBody>
+              <a:bodyPr rtlCol="0" anchor="ctr"/>
+              <a:lstStyle/>
+              <a:p>
+                <a:pPr algn="ctr"/>
+                <a:endParaRPr lang="en-US"/>
+              </a:p>
+            </p:txBody>
+          </p:sp>
+          <p:grpSp>
+            <p:nvGrpSpPr>
+              <p:cNvPr id="23" name="Group 22">
+                <a:extLst>
+                  <a:ext uri="{FF2B5EF4-FFF2-40B4-BE49-F238E27FC236}">
+                    <a16:creationId xmlns:a16="http://schemas.microsoft.com/office/drawing/2014/main" id="{B320FEA5-E65F-B8E6-1E08-4260BC5C9790}"/>
+                  </a:ext>
+                </a:extLst>
+              </p:cNvPr>
+              <p:cNvGrpSpPr/>
+              <p:nvPr/>
+            </p:nvGrpSpPr>
+            <p:grpSpPr>
+              <a:xfrm>
+                <a:off x="1030813" y="151804"/>
+                <a:ext cx="10487025" cy="6554391"/>
+                <a:chOff x="5457481" y="1814642"/>
+                <a:chExt cx="10487025" cy="6554391"/>
+              </a:xfrm>
+            </p:grpSpPr>
+            <p:pic>
+              <p:nvPicPr>
+                <p:cNvPr id="24" name="Picture 23" descr="A video game poster with a city and a space ship">
+                  <a:extLst>
+                    <a:ext uri="{FF2B5EF4-FFF2-40B4-BE49-F238E27FC236}">
+                      <a16:creationId xmlns:a16="http://schemas.microsoft.com/office/drawing/2014/main" id="{0EB06CD6-8493-2C46-B213-517C8FD8C1A1}"/>
+                    </a:ext>
+                  </a:extLst>
+                </p:cNvPr>
+                <p:cNvPicPr>
+                  <a:picLocks noChangeAspect="1"/>
+                </p:cNvPicPr>
+                <p:nvPr/>
+              </p:nvPicPr>
+              <p:blipFill>
+                <a:blip r:embed="rId2">
+                  <a:extLst>
+                    <a:ext uri="{28A0092B-C50C-407E-A947-70E740481C1C}">
+                      <a14:useLocalDpi xmlns:a14="http://schemas.microsoft.com/office/drawing/2010/main" val="0"/>
+                    </a:ext>
+                  </a:extLst>
+                </a:blip>
+                <a:stretch>
+                  <a:fillRect/>
+                </a:stretch>
+              </p:blipFill>
+              <p:spPr>
+                <a:xfrm>
+                  <a:off x="5457481" y="1814642"/>
+                  <a:ext cx="10487025" cy="6554391"/>
+                </a:xfrm>
+                <a:prstGeom prst="rect">
+                  <a:avLst/>
+                </a:prstGeom>
+              </p:spPr>
+            </p:pic>
+            <p:grpSp>
+              <p:nvGrpSpPr>
+                <p:cNvPr id="25" name="Group 24">
+                  <a:extLst>
+                    <a:ext uri="{FF2B5EF4-FFF2-40B4-BE49-F238E27FC236}">
+                      <a16:creationId xmlns:a16="http://schemas.microsoft.com/office/drawing/2014/main" id="{66CA8CA7-40E4-92DB-0776-279FD6DF746D}"/>
+                    </a:ext>
+                  </a:extLst>
+                </p:cNvPr>
+                <p:cNvGrpSpPr/>
+                <p:nvPr/>
+              </p:nvGrpSpPr>
+              <p:grpSpPr>
+                <a:xfrm>
+                  <a:off x="8561105" y="5942126"/>
+                  <a:ext cx="4167435" cy="2134491"/>
+                  <a:chOff x="8429132" y="5320422"/>
+                  <a:chExt cx="4167435" cy="2134491"/>
+                </a:xfrm>
+              </p:grpSpPr>
+              <p:sp>
+                <p:nvSpPr>
+                  <p:cNvPr id="26" name="Rectangle: Rounded Corners 25">
+                    <a:extLst>
+                      <a:ext uri="{FF2B5EF4-FFF2-40B4-BE49-F238E27FC236}">
+                        <a16:creationId xmlns:a16="http://schemas.microsoft.com/office/drawing/2014/main" id="{B3FB994A-F490-E4AF-A8CE-58BB66863993}"/>
+                      </a:ext>
+                    </a:extLst>
+                  </p:cNvPr>
+                  <p:cNvSpPr/>
+                  <p:nvPr/>
+                </p:nvSpPr>
+                <p:spPr>
+                  <a:xfrm>
+                    <a:off x="9444874" y="5320422"/>
+                    <a:ext cx="2248292" cy="651536"/>
+                  </a:xfrm>
+                  <a:prstGeom prst="roundRect">
+                    <a:avLst>
+                      <a:gd name="adj" fmla="val 50000"/>
+                    </a:avLst>
+                  </a:prstGeom>
+                </p:spPr>
+                <p:style>
+                  <a:lnRef idx="3">
+                    <a:schemeClr val="lt1"/>
+                  </a:lnRef>
+                  <a:fillRef idx="1">
+                    <a:schemeClr val="accent2"/>
+                  </a:fillRef>
+                  <a:effectRef idx="1">
+                    <a:schemeClr val="accent2"/>
+                  </a:effectRef>
+                  <a:fontRef idx="minor">
+                    <a:schemeClr val="lt1"/>
+                  </a:fontRef>
+                </p:style>
+                <p:txBody>
+                  <a:bodyPr rtlCol="0" anchor="ctr"/>
+                  <a:lstStyle/>
+                  <a:p>
+                    <a:pPr algn="ctr"/>
+                    <a:r>
+                      <a:rPr lang="en-US" dirty="0">
+                        <a:solidFill>
+                          <a:srgbClr val="1C1E1D"/>
+                        </a:solidFill>
+                        <a:latin typeface="Cooper Black" panose="0208090404030B020404" pitchFamily="18" charset="0"/>
+                      </a:rPr>
+                      <a:t>START</a:t>
+                    </a:r>
+                  </a:p>
+                </p:txBody>
+              </p:sp>
+              <p:sp>
+                <p:nvSpPr>
+                  <p:cNvPr id="27" name="Rectangle: Rounded Corners 26">
+                    <a:extLst>
+                      <a:ext uri="{FF2B5EF4-FFF2-40B4-BE49-F238E27FC236}">
+                        <a16:creationId xmlns:a16="http://schemas.microsoft.com/office/drawing/2014/main" id="{4BDE1439-AABB-E22C-BA59-F93C3DD31E3A}"/>
+                      </a:ext>
+                    </a:extLst>
+                  </p:cNvPr>
+                  <p:cNvSpPr/>
+                  <p:nvPr/>
+                </p:nvSpPr>
+                <p:spPr>
+                  <a:xfrm>
+                    <a:off x="8429132" y="6158179"/>
+                    <a:ext cx="1806803" cy="600159"/>
+                  </a:xfrm>
+                  <a:prstGeom prst="roundRect">
+                    <a:avLst>
+                      <a:gd name="adj" fmla="val 50000"/>
+                    </a:avLst>
+                  </a:prstGeom>
+                </p:spPr>
+                <p:style>
+                  <a:lnRef idx="3">
+                    <a:schemeClr val="lt1"/>
+                  </a:lnRef>
+                  <a:fillRef idx="1">
+                    <a:schemeClr val="accent2"/>
+                  </a:fillRef>
+                  <a:effectRef idx="1">
+                    <a:schemeClr val="accent2"/>
+                  </a:effectRef>
+                  <a:fontRef idx="minor">
+                    <a:schemeClr val="lt1"/>
+                  </a:fontRef>
+                </p:style>
+                <p:txBody>
+                  <a:bodyPr rtlCol="0" anchor="ctr"/>
+                  <a:lstStyle/>
+                  <a:p>
+                    <a:pPr algn="ctr"/>
+                    <a:r>
+                      <a:rPr lang="en-US" dirty="0">
+                        <a:solidFill>
+                          <a:srgbClr val="1C1E1D"/>
+                        </a:solidFill>
+                        <a:latin typeface="Cooper Black" panose="0208090404030B020404" pitchFamily="18" charset="0"/>
+                      </a:rPr>
+                      <a:t>SCORES</a:t>
+                    </a:r>
+                  </a:p>
+                </p:txBody>
+              </p:sp>
+              <p:sp>
+                <p:nvSpPr>
+                  <p:cNvPr id="28" name="Rectangle: Rounded Corners 27">
+                    <a:extLst>
+                      <a:ext uri="{FF2B5EF4-FFF2-40B4-BE49-F238E27FC236}">
+                        <a16:creationId xmlns:a16="http://schemas.microsoft.com/office/drawing/2014/main" id="{A69EC448-8605-A7D2-1389-85BD6F18ED32}"/>
+                      </a:ext>
+                    </a:extLst>
+                  </p:cNvPr>
+                  <p:cNvSpPr/>
+                  <p:nvPr/>
+                </p:nvSpPr>
+                <p:spPr>
+                  <a:xfrm>
+                    <a:off x="10789764" y="6158660"/>
+                    <a:ext cx="1806803" cy="600159"/>
+                  </a:xfrm>
+                  <a:prstGeom prst="roundRect">
+                    <a:avLst>
+                      <a:gd name="adj" fmla="val 50000"/>
+                    </a:avLst>
+                  </a:prstGeom>
+                </p:spPr>
+                <p:style>
+                  <a:lnRef idx="3">
+                    <a:schemeClr val="lt1"/>
+                  </a:lnRef>
+                  <a:fillRef idx="1">
+                    <a:schemeClr val="accent2"/>
+                  </a:fillRef>
+                  <a:effectRef idx="1">
+                    <a:schemeClr val="accent2"/>
+                  </a:effectRef>
+                  <a:fontRef idx="minor">
+                    <a:schemeClr val="lt1"/>
+                  </a:fontRef>
+                </p:style>
+                <p:txBody>
+                  <a:bodyPr rtlCol="0" anchor="ctr"/>
+                  <a:lstStyle/>
+                  <a:p>
+                    <a:pPr algn="ctr"/>
+                    <a:r>
+                      <a:rPr lang="en-US" dirty="0">
+                        <a:solidFill>
+                          <a:srgbClr val="1C1E1D"/>
+                        </a:solidFill>
+                        <a:latin typeface="Cooper Black" panose="0208090404030B020404" pitchFamily="18" charset="0"/>
+                      </a:rPr>
+                      <a:t>SETTINGS</a:t>
+                    </a:r>
+                  </a:p>
+                </p:txBody>
+              </p:sp>
+              <p:sp>
+                <p:nvSpPr>
+                  <p:cNvPr id="29" name="Rectangle: Rounded Corners 28">
+                    <a:extLst>
+                      <a:ext uri="{FF2B5EF4-FFF2-40B4-BE49-F238E27FC236}">
+                        <a16:creationId xmlns:a16="http://schemas.microsoft.com/office/drawing/2014/main" id="{6DBB8B3E-E0DF-DE7C-E869-F6EE5C1A0D8B}"/>
+                      </a:ext>
+                    </a:extLst>
+                  </p:cNvPr>
+                  <p:cNvSpPr/>
+                  <p:nvPr/>
+                </p:nvSpPr>
+                <p:spPr>
+                  <a:xfrm>
+                    <a:off x="9842879" y="6944559"/>
+                    <a:ext cx="1239295" cy="510354"/>
+                  </a:xfrm>
+                  <a:prstGeom prst="roundRect">
+                    <a:avLst>
+                      <a:gd name="adj" fmla="val 50000"/>
+                    </a:avLst>
+                  </a:prstGeom>
+                </p:spPr>
+                <p:style>
+                  <a:lnRef idx="3">
+                    <a:schemeClr val="lt1"/>
+                  </a:lnRef>
+                  <a:fillRef idx="1">
+                    <a:schemeClr val="accent2"/>
+                  </a:fillRef>
+                  <a:effectRef idx="1">
+                    <a:schemeClr val="accent2"/>
+                  </a:effectRef>
+                  <a:fontRef idx="minor">
+                    <a:schemeClr val="lt1"/>
+                  </a:fontRef>
+                </p:style>
+                <p:txBody>
+                  <a:bodyPr rtlCol="0" anchor="ctr"/>
+                  <a:lstStyle/>
+                  <a:p>
+                    <a:pPr algn="ctr"/>
+                    <a:r>
+                      <a:rPr lang="en-US" dirty="0">
+                        <a:solidFill>
+                          <a:srgbClr val="1C1E1D"/>
+                        </a:solidFill>
+                        <a:latin typeface="Cooper Black" panose="0208090404030B020404" pitchFamily="18" charset="0"/>
+                      </a:rPr>
+                      <a:t>EXIT</a:t>
+                    </a:r>
+                  </a:p>
+                </p:txBody>
+              </p:sp>
+            </p:grpSp>
+          </p:grpSp>
+        </p:grpSp>
+        <p:pic>
+          <p:nvPicPr>
+            <p:cNvPr id="20" name="Picture 19" descr="A blue and yellow space ship&#10;&#10;Description automatically generated">
+              <a:extLst>
+                <a:ext uri="{FF2B5EF4-FFF2-40B4-BE49-F238E27FC236}">
+                  <a16:creationId xmlns:a16="http://schemas.microsoft.com/office/drawing/2014/main" id="{0D133176-E92C-ABF4-A6DD-2ECD2C160251}"/>
+                </a:ext>
+              </a:extLst>
+            </p:cNvPr>
+            <p:cNvPicPr>
+              <a:picLocks noChangeAspect="1"/>
+            </p:cNvPicPr>
+            <p:nvPr/>
+          </p:nvPicPr>
+          <p:blipFill>
+            <a:blip r:embed="rId3">
+              <a:extLst>
+                <a:ext uri="{28A0092B-C50C-407E-A947-70E740481C1C}">
+                  <a14:useLocalDpi xmlns:a14="http://schemas.microsoft.com/office/drawing/2010/main" val="0"/>
+                </a:ext>
+              </a:extLst>
+            </a:blip>
+            <a:stretch>
+              <a:fillRect/>
+            </a:stretch>
+          </p:blipFill>
+          <p:spPr>
+            <a:xfrm>
+              <a:off x="2436707" y="5863591"/>
+              <a:ext cx="757764" cy="757764"/>
+            </a:xfrm>
+            <a:prstGeom prst="rect">
+              <a:avLst/>
+            </a:prstGeom>
+          </p:spPr>
+        </p:pic>
+        <p:sp>
+          <p:nvSpPr>
+            <p:cNvPr id="31" name="Rectangle 30">
+              <a:extLst>
+                <a:ext uri="{FF2B5EF4-FFF2-40B4-BE49-F238E27FC236}">
+                  <a16:creationId xmlns:a16="http://schemas.microsoft.com/office/drawing/2014/main" id="{676DF877-800E-F48D-E3EE-F6F4F7F5533D}"/>
+                </a:ext>
+              </a:extLst>
+            </p:cNvPr>
+            <p:cNvSpPr/>
+            <p:nvPr/>
+          </p:nvSpPr>
+          <p:spPr>
+            <a:xfrm>
+              <a:off x="1442968" y="5802045"/>
+              <a:ext cx="789588" cy="868256"/>
+            </a:xfrm>
+            <a:prstGeom prst="rect">
+              <a:avLst/>
+            </a:prstGeom>
+            <a:solidFill>
+              <a:schemeClr val="tx2">
+                <a:lumMod val="50000"/>
+                <a:lumOff val="50000"/>
+              </a:schemeClr>
+            </a:solidFill>
+            <a:ln>
+              <a:solidFill>
+                <a:schemeClr val="tx2">
+                  <a:lumMod val="25000"/>
+                  <a:lumOff val="75000"/>
+                </a:schemeClr>
+              </a:solidFill>
+            </a:ln>
+          </p:spPr>
+          <p:style>
+            <a:lnRef idx="2">
+              <a:schemeClr val="accent1">
+                <a:shade val="15000"/>
+              </a:schemeClr>
+            </a:lnRef>
+            <a:fillRef idx="1">
+              <a:schemeClr val="accent1"/>
+            </a:fillRef>
+            <a:effectRef idx="0">
+              <a:schemeClr val="accent1"/>
+            </a:effectRef>
+            <a:fontRef idx="minor">
+              <a:schemeClr val="lt1"/>
+            </a:fontRef>
+          </p:style>
+          <p:txBody>
+            <a:bodyPr rtlCol="0" anchor="ctr"/>
+            <a:lstStyle/>
+            <a:p>
+              <a:pPr algn="ctr"/>
+              <a:endParaRPr lang="en-US" dirty="0"/>
+            </a:p>
+          </p:txBody>
+        </p:sp>
+        <p:pic>
+          <p:nvPicPr>
+            <p:cNvPr id="21" name="Picture 20" descr="A blue and white spaceship&#10;&#10;Description automatically generated">
+              <a:extLst>
+                <a:ext uri="{FF2B5EF4-FFF2-40B4-BE49-F238E27FC236}">
+                  <a16:creationId xmlns:a16="http://schemas.microsoft.com/office/drawing/2014/main" id="{F8D97351-086E-410A-EEA8-6C31B2E27B2A}"/>
+                </a:ext>
+              </a:extLst>
+            </p:cNvPr>
+            <p:cNvPicPr>
+              <a:picLocks noChangeAspect="1"/>
+            </p:cNvPicPr>
+            <p:nvPr/>
+          </p:nvPicPr>
+          <p:blipFill>
+            <a:blip r:embed="rId4">
+              <a:extLst>
+                <a:ext uri="{28A0092B-C50C-407E-A947-70E740481C1C}">
+                  <a14:useLocalDpi xmlns:a14="http://schemas.microsoft.com/office/drawing/2010/main" val="0"/>
+                </a:ext>
+              </a:extLst>
+            </a:blip>
+            <a:stretch>
+              <a:fillRect/>
+            </a:stretch>
+          </p:blipFill>
+          <p:spPr>
+            <a:xfrm>
+              <a:off x="1458880" y="5857291"/>
+              <a:ext cx="757764" cy="757764"/>
+            </a:xfrm>
+            <a:prstGeom prst="rect">
+              <a:avLst/>
+            </a:prstGeom>
+          </p:spPr>
+        </p:pic>
+      </p:grpSp>
+    </p:spTree>
+    <p:extLst>
+      <p:ext uri="{BB962C8B-B14F-4D97-AF65-F5344CB8AC3E}">
+        <p14:creationId xmlns:p14="http://schemas.microsoft.com/office/powerpoint/2010/main" val="3827673754"/>
+      </p:ext>
+    </p:extLst>
+  </p:cSld>
+  <p:clrMapOvr>
+    <a:masterClrMapping/>
+  </p:clrMapOvr>
+</p:sld>
+</file>
+
+<file path=ppt/slides/slide4.xml><?xml version="1.0" encoding="utf-8"?>
 <p:sld xmlns:a="http://schemas.openxmlformats.org/drawingml/2006/main" xmlns:r="http://schemas.openxmlformats.org/officeDocument/2006/relationships" xmlns:p="http://schemas.openxmlformats.org/presentationml/2006/main">
   <p:cSld>
     <p:spTree>
@@ -4147,7 +5685,7 @@
 </p:sld>
 </file>
 
-<file path=ppt/slides/slide3.xml><?xml version="1.0" encoding="utf-8"?>
+<file path=ppt/slides/slide5.xml><?xml version="1.0" encoding="utf-8"?>
 <p:sld xmlns:a="http://schemas.openxmlformats.org/drawingml/2006/main" xmlns:r="http://schemas.openxmlformats.org/officeDocument/2006/relationships" xmlns:p="http://schemas.openxmlformats.org/presentationml/2006/main">
   <p:cSld>
     <p:spTree>
@@ -4665,7 +6203,7 @@
 </p:sld>
 </file>
 
-<file path=ppt/slides/slide4.xml><?xml version="1.0" encoding="utf-8"?>
+<file path=ppt/slides/slide6.xml><?xml version="1.0" encoding="utf-8"?>
 <p:sld xmlns:a="http://schemas.openxmlformats.org/drawingml/2006/main" xmlns:r="http://schemas.openxmlformats.org/officeDocument/2006/relationships" xmlns:p="http://schemas.openxmlformats.org/presentationml/2006/main">
   <p:cSld>
     <p:spTree>
@@ -4998,7 +6536,7 @@
 </p:sld>
 </file>
 
-<file path=ppt/slides/slide5.xml><?xml version="1.0" encoding="utf-8"?>
+<file path=ppt/slides/slide7.xml><?xml version="1.0" encoding="utf-8"?>
 <p:sld xmlns:a="http://schemas.openxmlformats.org/drawingml/2006/main" xmlns:r="http://schemas.openxmlformats.org/officeDocument/2006/relationships" xmlns:p="http://schemas.openxmlformats.org/presentationml/2006/main">
   <p:cSld>
     <p:spTree>
@@ -5151,7 +6689,7 @@
 </p:sld>
 </file>
 
-<file path=ppt/slides/slide6.xml><?xml version="1.0" encoding="utf-8"?>
+<file path=ppt/slides/slide8.xml><?xml version="1.0" encoding="utf-8"?>
 <p:sld xmlns:a="http://schemas.openxmlformats.org/drawingml/2006/main" xmlns:r="http://schemas.openxmlformats.org/officeDocument/2006/relationships" xmlns:p="http://schemas.openxmlformats.org/presentationml/2006/main">
   <p:cSld>
     <p:spTree>
@@ -5305,7 +6843,7 @@
 </p:sld>
 </file>
 
-<file path=ppt/slides/slide7.xml><?xml version="1.0" encoding="utf-8"?>
+<file path=ppt/slides/slide9.xml><?xml version="1.0" encoding="utf-8"?>
 <p:sld xmlns:a="http://schemas.openxmlformats.org/drawingml/2006/main" xmlns:r="http://schemas.openxmlformats.org/officeDocument/2006/relationships" xmlns:p="http://schemas.openxmlformats.org/presentationml/2006/main">
   <p:cSld>
     <p:spTree>
@@ -5394,454 +6932,6 @@
     <p:extLst>
       <p:ext uri="{BB962C8B-B14F-4D97-AF65-F5344CB8AC3E}">
         <p14:creationId xmlns:p14="http://schemas.microsoft.com/office/powerpoint/2010/main" val="3477451611"/>
-      </p:ext>
-    </p:extLst>
-  </p:cSld>
-  <p:clrMapOvr>
-    <a:masterClrMapping/>
-  </p:clrMapOvr>
-</p:sld>
-</file>
-
-<file path=ppt/slides/slide8.xml><?xml version="1.0" encoding="utf-8"?>
-<p:sld xmlns:a="http://schemas.openxmlformats.org/drawingml/2006/main" xmlns:r="http://schemas.openxmlformats.org/officeDocument/2006/relationships" xmlns:p="http://schemas.openxmlformats.org/presentationml/2006/main">
-  <p:cSld>
-    <p:spTree>
-      <p:nvGrpSpPr>
-        <p:cNvPr id="1" name=""/>
-        <p:cNvGrpSpPr/>
-        <p:nvPr/>
-      </p:nvGrpSpPr>
-      <p:grpSpPr>
-        <a:xfrm>
-          <a:off x="0" y="0"/>
-          <a:ext cx="0" cy="0"/>
-          <a:chOff x="0" y="0"/>
-          <a:chExt cx="0" cy="0"/>
-        </a:xfrm>
-      </p:grpSpPr>
-      <p:grpSp>
-        <p:nvGrpSpPr>
-          <p:cNvPr id="10" name="Group 9">
-            <a:extLst>
-              <a:ext uri="{FF2B5EF4-FFF2-40B4-BE49-F238E27FC236}">
-                <a16:creationId xmlns:a16="http://schemas.microsoft.com/office/drawing/2014/main" id="{FC7209A1-80F9-C978-275A-6DAE564D827E}"/>
-              </a:ext>
-            </a:extLst>
-          </p:cNvPr>
-          <p:cNvGrpSpPr/>
-          <p:nvPr/>
-        </p:nvGrpSpPr>
-        <p:grpSpPr>
-          <a:xfrm>
-            <a:off x="852487" y="236645"/>
-            <a:ext cx="10487025" cy="6554391"/>
-            <a:chOff x="852487" y="236645"/>
-            <a:chExt cx="10487025" cy="6554391"/>
-          </a:xfrm>
-        </p:grpSpPr>
-        <p:grpSp>
-          <p:nvGrpSpPr>
-            <p:cNvPr id="15" name="Group 14">
-              <a:extLst>
-                <a:ext uri="{FF2B5EF4-FFF2-40B4-BE49-F238E27FC236}">
-                  <a16:creationId xmlns:a16="http://schemas.microsoft.com/office/drawing/2014/main" id="{C16D5CEF-FCD7-C9E6-A62D-C7536D54C630}"/>
-                </a:ext>
-              </a:extLst>
-            </p:cNvPr>
-            <p:cNvGrpSpPr/>
-            <p:nvPr/>
-          </p:nvGrpSpPr>
-          <p:grpSpPr>
-            <a:xfrm>
-              <a:off x="852487" y="236645"/>
-              <a:ext cx="10487025" cy="6554391"/>
-              <a:chOff x="852487" y="236645"/>
-              <a:chExt cx="10487025" cy="6554391"/>
-            </a:xfrm>
-          </p:grpSpPr>
-          <p:grpSp>
-            <p:nvGrpSpPr>
-              <p:cNvPr id="4" name="Group 3">
-                <a:extLst>
-                  <a:ext uri="{FF2B5EF4-FFF2-40B4-BE49-F238E27FC236}">
-                    <a16:creationId xmlns:a16="http://schemas.microsoft.com/office/drawing/2014/main" id="{AE878858-C871-A6B1-771E-E414FCFC703B}"/>
-                  </a:ext>
-                </a:extLst>
-              </p:cNvPr>
-              <p:cNvGrpSpPr/>
-              <p:nvPr/>
-            </p:nvGrpSpPr>
-            <p:grpSpPr>
-              <a:xfrm>
-                <a:off x="852487" y="236645"/>
-                <a:ext cx="10487025" cy="6554391"/>
-                <a:chOff x="1030813" y="151804"/>
-                <a:chExt cx="10487025" cy="6554391"/>
-              </a:xfrm>
-            </p:grpSpPr>
-            <p:sp>
-              <p:nvSpPr>
-                <p:cNvPr id="5" name="Rectangle: Rounded Corners 4">
-                  <a:extLst>
-                    <a:ext uri="{FF2B5EF4-FFF2-40B4-BE49-F238E27FC236}">
-                      <a16:creationId xmlns:a16="http://schemas.microsoft.com/office/drawing/2014/main" id="{ACED6574-6C6E-3C72-A950-BA434E6B5FFB}"/>
-                    </a:ext>
-                  </a:extLst>
-                </p:cNvPr>
-                <p:cNvSpPr/>
-                <p:nvPr/>
-              </p:nvSpPr>
-              <p:spPr>
-                <a:xfrm>
-                  <a:off x="5037839" y="4766070"/>
-                  <a:ext cx="2248292" cy="651536"/>
-                </a:xfrm>
-                <a:prstGeom prst="roundRect">
-                  <a:avLst>
-                    <a:gd name="adj" fmla="val 50000"/>
-                  </a:avLst>
-                </a:prstGeom>
-              </p:spPr>
-              <p:style>
-                <a:lnRef idx="3">
-                  <a:schemeClr val="lt1"/>
-                </a:lnRef>
-                <a:fillRef idx="1">
-                  <a:schemeClr val="accent2"/>
-                </a:fillRef>
-                <a:effectRef idx="1">
-                  <a:schemeClr val="accent2"/>
-                </a:effectRef>
-                <a:fontRef idx="minor">
-                  <a:schemeClr val="lt1"/>
-                </a:fontRef>
-              </p:style>
-              <p:txBody>
-                <a:bodyPr rtlCol="0" anchor="ctr"/>
-                <a:lstStyle/>
-                <a:p>
-                  <a:pPr algn="ctr"/>
-                  <a:endParaRPr lang="en-US"/>
-                </a:p>
-              </p:txBody>
-            </p:sp>
-            <p:pic>
-              <p:nvPicPr>
-                <p:cNvPr id="7" name="Picture 6" descr="A video game poster with a city and a space ship">
-                  <a:extLst>
-                    <a:ext uri="{FF2B5EF4-FFF2-40B4-BE49-F238E27FC236}">
-                      <a16:creationId xmlns:a16="http://schemas.microsoft.com/office/drawing/2014/main" id="{9D52E824-A6D0-68BE-FC63-D3F91B0CA919}"/>
-                    </a:ext>
-                  </a:extLst>
-                </p:cNvPr>
-                <p:cNvPicPr>
-                  <a:picLocks noChangeAspect="1"/>
-                </p:cNvPicPr>
-                <p:nvPr/>
-              </p:nvPicPr>
-              <p:blipFill>
-                <a:blip r:embed="rId2">
-                  <a:extLst>
-                    <a:ext uri="{28A0092B-C50C-407E-A947-70E740481C1C}">
-                      <a14:useLocalDpi xmlns:a14="http://schemas.microsoft.com/office/drawing/2010/main" val="0"/>
-                    </a:ext>
-                  </a:extLst>
-                </a:blip>
-                <a:stretch>
-                  <a:fillRect/>
-                </a:stretch>
-              </p:blipFill>
-              <p:spPr>
-                <a:xfrm>
-                  <a:off x="1030813" y="151804"/>
-                  <a:ext cx="10487025" cy="6554391"/>
-                </a:xfrm>
-                <a:prstGeom prst="rect">
-                  <a:avLst/>
-                </a:prstGeom>
-              </p:spPr>
-            </p:pic>
-          </p:grpSp>
-          <p:sp>
-            <p:nvSpPr>
-              <p:cNvPr id="13" name="Multiplication Sign 12">
-                <a:extLst>
-                  <a:ext uri="{FF2B5EF4-FFF2-40B4-BE49-F238E27FC236}">
-                    <a16:creationId xmlns:a16="http://schemas.microsoft.com/office/drawing/2014/main" id="{C6982AE2-1854-5676-468A-8B93C380D298}"/>
-                  </a:ext>
-                </a:extLst>
-              </p:cNvPr>
-              <p:cNvSpPr/>
-              <p:nvPr/>
-            </p:nvSpPr>
-            <p:spPr>
-              <a:xfrm>
-                <a:off x="10573851" y="374466"/>
-                <a:ext cx="659876" cy="612742"/>
-              </a:xfrm>
-              <a:prstGeom prst="mathMultiply">
-                <a:avLst/>
-              </a:prstGeom>
-              <a:solidFill>
-                <a:srgbClr val="92D050"/>
-              </a:solidFill>
-            </p:spPr>
-            <p:style>
-              <a:lnRef idx="2">
-                <a:schemeClr val="accent1">
-                  <a:shade val="15000"/>
-                </a:schemeClr>
-              </a:lnRef>
-              <a:fillRef idx="1">
-                <a:schemeClr val="accent1"/>
-              </a:fillRef>
-              <a:effectRef idx="0">
-                <a:schemeClr val="accent1"/>
-              </a:effectRef>
-              <a:fontRef idx="minor">
-                <a:schemeClr val="lt1"/>
-              </a:fontRef>
-            </p:style>
-            <p:txBody>
-              <a:bodyPr rtlCol="0" anchor="ctr"/>
-              <a:lstStyle/>
-              <a:p>
-                <a:pPr algn="ctr"/>
-                <a:endParaRPr lang="en-US"/>
-              </a:p>
-            </p:txBody>
-          </p:sp>
-          <p:sp>
-            <p:nvSpPr>
-              <p:cNvPr id="14" name="Rectangle 13">
-                <a:extLst>
-                  <a:ext uri="{FF2B5EF4-FFF2-40B4-BE49-F238E27FC236}">
-                    <a16:creationId xmlns:a16="http://schemas.microsoft.com/office/drawing/2014/main" id="{A9F9FEC6-04A6-FD1D-1918-9D980A9AC9FF}"/>
-                  </a:ext>
-                </a:extLst>
-              </p:cNvPr>
-              <p:cNvSpPr/>
-              <p:nvPr/>
-            </p:nvSpPr>
-            <p:spPr>
-              <a:xfrm>
-                <a:off x="5065059" y="4087906"/>
-                <a:ext cx="2248292" cy="651536"/>
-              </a:xfrm>
-              <a:prstGeom prst="rect">
-                <a:avLst/>
-              </a:prstGeom>
-            </p:spPr>
-            <p:style>
-              <a:lnRef idx="2">
-                <a:schemeClr val="accent1">
-                  <a:shade val="15000"/>
-                </a:schemeClr>
-              </a:lnRef>
-              <a:fillRef idx="1">
-                <a:schemeClr val="accent1"/>
-              </a:fillRef>
-              <a:effectRef idx="0">
-                <a:schemeClr val="accent1"/>
-              </a:effectRef>
-              <a:fontRef idx="minor">
-                <a:schemeClr val="lt1"/>
-              </a:fontRef>
-            </p:style>
-            <p:txBody>
-              <a:bodyPr rtlCol="0" anchor="ctr"/>
-              <a:lstStyle/>
-              <a:p>
-                <a:pPr algn="ctr"/>
-                <a:r>
-                  <a:rPr lang="en-US" dirty="0"/>
-                  <a:t>HIGH SCORES</a:t>
-                </a:r>
-              </a:p>
-            </p:txBody>
-          </p:sp>
-        </p:grpSp>
-        <p:sp>
-          <p:nvSpPr>
-            <p:cNvPr id="2" name="TextBox 1">
-              <a:extLst>
-                <a:ext uri="{FF2B5EF4-FFF2-40B4-BE49-F238E27FC236}">
-                  <a16:creationId xmlns:a16="http://schemas.microsoft.com/office/drawing/2014/main" id="{276D07EC-8EAA-F807-B6D2-805DE6D29F75}"/>
-                </a:ext>
-              </a:extLst>
-            </p:cNvPr>
-            <p:cNvSpPr txBox="1"/>
-            <p:nvPr/>
-          </p:nvSpPr>
-          <p:spPr>
-            <a:xfrm>
-              <a:off x="5396753" y="4807347"/>
-              <a:ext cx="373820" cy="369332"/>
-            </a:xfrm>
-            <a:prstGeom prst="rect">
-              <a:avLst/>
-            </a:prstGeom>
-            <a:noFill/>
-          </p:spPr>
-          <p:txBody>
-            <a:bodyPr wrap="none" rtlCol="0">
-              <a:spAutoFit/>
-            </a:bodyPr>
-            <a:lstStyle/>
-            <a:p>
-              <a:r>
-                <a:rPr lang="en-US" dirty="0"/>
-                <a:t>1.</a:t>
-              </a:r>
-            </a:p>
-          </p:txBody>
-        </p:sp>
-        <p:sp>
-          <p:nvSpPr>
-            <p:cNvPr id="3" name="TextBox 2">
-              <a:extLst>
-                <a:ext uri="{FF2B5EF4-FFF2-40B4-BE49-F238E27FC236}">
-                  <a16:creationId xmlns:a16="http://schemas.microsoft.com/office/drawing/2014/main" id="{4DEA157F-3AFD-BDFC-6FF4-93718A56C114}"/>
-                </a:ext>
-              </a:extLst>
-            </p:cNvPr>
-            <p:cNvSpPr txBox="1"/>
-            <p:nvPr/>
-          </p:nvSpPr>
-          <p:spPr>
-            <a:xfrm>
-              <a:off x="5396753" y="5131136"/>
-              <a:ext cx="373820" cy="369332"/>
-            </a:xfrm>
-            <a:prstGeom prst="rect">
-              <a:avLst/>
-            </a:prstGeom>
-            <a:noFill/>
-          </p:spPr>
-          <p:txBody>
-            <a:bodyPr wrap="none" rtlCol="0">
-              <a:spAutoFit/>
-            </a:bodyPr>
-            <a:lstStyle/>
-            <a:p>
-              <a:r>
-                <a:rPr lang="en-US" dirty="0"/>
-                <a:t>2.</a:t>
-              </a:r>
-            </a:p>
-          </p:txBody>
-        </p:sp>
-        <p:sp>
-          <p:nvSpPr>
-            <p:cNvPr id="6" name="TextBox 5">
-              <a:extLst>
-                <a:ext uri="{FF2B5EF4-FFF2-40B4-BE49-F238E27FC236}">
-                  <a16:creationId xmlns:a16="http://schemas.microsoft.com/office/drawing/2014/main" id="{2FA40C92-8860-FF8B-65FE-D438CD83F4E1}"/>
-                </a:ext>
-              </a:extLst>
-            </p:cNvPr>
-            <p:cNvSpPr txBox="1"/>
-            <p:nvPr/>
-          </p:nvSpPr>
-          <p:spPr>
-            <a:xfrm>
-              <a:off x="5396753" y="5451641"/>
-              <a:ext cx="373820" cy="369332"/>
-            </a:xfrm>
-            <a:prstGeom prst="rect">
-              <a:avLst/>
-            </a:prstGeom>
-            <a:noFill/>
-          </p:spPr>
-          <p:txBody>
-            <a:bodyPr wrap="none" rtlCol="0">
-              <a:spAutoFit/>
-            </a:bodyPr>
-            <a:lstStyle/>
-            <a:p>
-              <a:r>
-                <a:rPr lang="en-US" dirty="0"/>
-                <a:t>3.</a:t>
-              </a:r>
-            </a:p>
-          </p:txBody>
-        </p:sp>
-        <p:sp>
-          <p:nvSpPr>
-            <p:cNvPr id="8" name="TextBox 7">
-              <a:extLst>
-                <a:ext uri="{FF2B5EF4-FFF2-40B4-BE49-F238E27FC236}">
-                  <a16:creationId xmlns:a16="http://schemas.microsoft.com/office/drawing/2014/main" id="{89409CE6-5FFA-74F2-17AA-6F5EB31EE0C8}"/>
-                </a:ext>
-              </a:extLst>
-            </p:cNvPr>
-            <p:cNvSpPr txBox="1"/>
-            <p:nvPr/>
-          </p:nvSpPr>
-          <p:spPr>
-            <a:xfrm>
-              <a:off x="5396753" y="5820973"/>
-              <a:ext cx="373820" cy="369332"/>
-            </a:xfrm>
-            <a:prstGeom prst="rect">
-              <a:avLst/>
-            </a:prstGeom>
-            <a:noFill/>
-          </p:spPr>
-          <p:txBody>
-            <a:bodyPr wrap="none" rtlCol="0">
-              <a:spAutoFit/>
-            </a:bodyPr>
-            <a:lstStyle/>
-            <a:p>
-              <a:r>
-                <a:rPr lang="en-US" dirty="0"/>
-                <a:t>4.</a:t>
-              </a:r>
-            </a:p>
-          </p:txBody>
-        </p:sp>
-        <p:sp>
-          <p:nvSpPr>
-            <p:cNvPr id="9" name="TextBox 8">
-              <a:extLst>
-                <a:ext uri="{FF2B5EF4-FFF2-40B4-BE49-F238E27FC236}">
-                  <a16:creationId xmlns:a16="http://schemas.microsoft.com/office/drawing/2014/main" id="{E9717A5B-FEBF-E25C-3804-A1D4CE0E6306}"/>
-                </a:ext>
-              </a:extLst>
-            </p:cNvPr>
-            <p:cNvSpPr txBox="1"/>
-            <p:nvPr/>
-          </p:nvSpPr>
-          <p:spPr>
-            <a:xfrm>
-              <a:off x="5396753" y="6149067"/>
-              <a:ext cx="373820" cy="369332"/>
-            </a:xfrm>
-            <a:prstGeom prst="rect">
-              <a:avLst/>
-            </a:prstGeom>
-            <a:noFill/>
-          </p:spPr>
-          <p:txBody>
-            <a:bodyPr wrap="none" rtlCol="0">
-              <a:spAutoFit/>
-            </a:bodyPr>
-            <a:lstStyle/>
-            <a:p>
-              <a:r>
-                <a:rPr lang="en-US" dirty="0"/>
-                <a:t>5.</a:t>
-              </a:r>
-            </a:p>
-          </p:txBody>
-        </p:sp>
-      </p:grpSp>
-    </p:spTree>
-    <p:extLst>
-      <p:ext uri="{BB962C8B-B14F-4D97-AF65-F5344CB8AC3E}">
-        <p14:creationId xmlns:p14="http://schemas.microsoft.com/office/powerpoint/2010/main" val="1853303283"/>
       </p:ext>
     </p:extLst>
   </p:cSld>

</xml_diff>